<commit_message>
Created Basic Folder Structure
</commit_message>
<xml_diff>
--- a/Skeduler Wireframe.pptx
+++ b/Skeduler Wireframe.pptx
@@ -104,6 +104,11 @@
       </a:defRPr>
     </a:lvl9pPr>
   </p:defaultTextStyle>
+  <p:extLst>
+    <p:ext uri="{EFAFB233-063F-42B5-8137-9DF3F51BA10A}">
+      <p15:sldGuideLst xmlns:p15="http://schemas.microsoft.com/office/powerpoint/2012/main"/>
+    </p:ext>
+  </p:extLst>
 </p:presentation>
 </file>
 
@@ -3397,7 +3402,7 @@
           <a:lstStyle/>
           <a:p>
             <a:pPr algn="ctr"/>
-            <a:endParaRPr lang="en-MY"/>
+            <a:endParaRPr lang="en-MY" dirty="0"/>
           </a:p>
         </p:txBody>
       </p:sp>
@@ -3976,7 +3981,7 @@
               <a:lstStyle/>
               <a:p>
                 <a:pPr algn="ctr"/>
-                <a:endParaRPr lang="en-MY"/>
+                <a:endParaRPr lang="en-MY" dirty="0"/>
               </a:p>
             </p:txBody>
           </p:sp>
@@ -4028,7 +4033,7 @@
               <a:lstStyle/>
               <a:p>
                 <a:pPr algn="ctr"/>
-                <a:endParaRPr lang="en-MY"/>
+                <a:endParaRPr lang="en-MY" dirty="0"/>
               </a:p>
             </p:txBody>
           </p:sp>
@@ -4080,7 +4085,7 @@
               <a:lstStyle/>
               <a:p>
                 <a:pPr algn="ctr"/>
-                <a:endParaRPr lang="en-MY"/>
+                <a:endParaRPr lang="en-MY" dirty="0"/>
               </a:p>
             </p:txBody>
           </p:sp>
@@ -4136,7 +4141,7 @@
           <a:lstStyle/>
           <a:p>
             <a:pPr algn="ctr"/>
-            <a:endParaRPr lang="en-MY"/>
+            <a:endParaRPr lang="en-MY" dirty="0"/>
           </a:p>
         </p:txBody>
       </p:sp>
@@ -4699,7 +4704,7 @@
               <a:lstStyle/>
               <a:p>
                 <a:pPr algn="ctr"/>
-                <a:endParaRPr lang="en-MY"/>
+                <a:endParaRPr lang="en-MY" dirty="0"/>
               </a:p>
             </p:txBody>
           </p:sp>
@@ -4751,7 +4756,7 @@
               <a:lstStyle/>
               <a:p>
                 <a:pPr algn="ctr"/>
-                <a:endParaRPr lang="en-MY"/>
+                <a:endParaRPr lang="en-MY" dirty="0"/>
               </a:p>
             </p:txBody>
           </p:sp>
@@ -4803,7 +4808,7 @@
               <a:lstStyle/>
               <a:p>
                 <a:pPr algn="ctr"/>
-                <a:endParaRPr lang="en-MY"/>
+                <a:endParaRPr lang="en-MY" dirty="0"/>
               </a:p>
             </p:txBody>
           </p:sp>
@@ -4859,7 +4864,7 @@
           <a:lstStyle/>
           <a:p>
             <a:pPr algn="ctr"/>
-            <a:endParaRPr lang="en-MY"/>
+            <a:endParaRPr lang="en-US" noProof="1"/>
           </a:p>
         </p:txBody>
       </p:sp>
@@ -5422,7 +5427,7 @@
               <a:lstStyle/>
               <a:p>
                 <a:pPr algn="ctr"/>
-                <a:endParaRPr lang="en-MY"/>
+                <a:endParaRPr lang="en-MY" dirty="0"/>
               </a:p>
             </p:txBody>
           </p:sp>
@@ -5474,7 +5479,7 @@
               <a:lstStyle/>
               <a:p>
                 <a:pPr algn="ctr"/>
-                <a:endParaRPr lang="en-MY"/>
+                <a:endParaRPr lang="en-MY" dirty="0"/>
               </a:p>
             </p:txBody>
           </p:sp>
@@ -5501,6 +5506,1165 @@
               <a:solidFill>
                 <a:schemeClr val="bg1"/>
               </a:solidFill>
+              <a:ln>
+                <a:noFill/>
+              </a:ln>
+            </p:spPr>
+            <p:style>
+              <a:lnRef idx="2">
+                <a:schemeClr val="accent1">
+                  <a:shade val="50000"/>
+                </a:schemeClr>
+              </a:lnRef>
+              <a:fillRef idx="1">
+                <a:schemeClr val="accent1"/>
+              </a:fillRef>
+              <a:effectRef idx="0">
+                <a:schemeClr val="accent1"/>
+              </a:effectRef>
+              <a:fontRef idx="minor">
+                <a:schemeClr val="lt1"/>
+              </a:fontRef>
+            </p:style>
+            <p:txBody>
+              <a:bodyPr rtlCol="0" anchor="ctr"/>
+              <a:lstStyle/>
+              <a:p>
+                <a:pPr algn="ctr"/>
+                <a:endParaRPr lang="en-MY" dirty="0"/>
+              </a:p>
+            </p:txBody>
+          </p:sp>
+        </p:grpSp>
+      </p:grpSp>
+      <p:grpSp>
+        <p:nvGrpSpPr>
+          <p:cNvPr id="7" name="Group 6">
+            <a:extLst>
+              <a:ext uri="{FF2B5EF4-FFF2-40B4-BE49-F238E27FC236}">
+                <a16:creationId xmlns:a16="http://schemas.microsoft.com/office/drawing/2014/main" id="{74A767D1-2620-4966-AE2A-92A8A2650999}"/>
+              </a:ext>
+            </a:extLst>
+          </p:cNvPr>
+          <p:cNvGrpSpPr/>
+          <p:nvPr/>
+        </p:nvGrpSpPr>
+        <p:grpSpPr>
+          <a:xfrm>
+            <a:off x="5900928" y="1005078"/>
+            <a:ext cx="2535936" cy="305562"/>
+            <a:chOff x="5900928" y="1005078"/>
+            <a:chExt cx="2535936" cy="305562"/>
+          </a:xfrm>
+        </p:grpSpPr>
+        <p:sp>
+          <p:nvSpPr>
+            <p:cNvPr id="3" name="Rectangle 2">
+              <a:extLst>
+                <a:ext uri="{FF2B5EF4-FFF2-40B4-BE49-F238E27FC236}">
+                  <a16:creationId xmlns:a16="http://schemas.microsoft.com/office/drawing/2014/main" id="{A36D4EE8-CEA2-4751-822B-5A90F3DD4715}"/>
+                </a:ext>
+              </a:extLst>
+            </p:cNvPr>
+            <p:cNvSpPr/>
+            <p:nvPr/>
+          </p:nvSpPr>
+          <p:spPr>
+            <a:xfrm>
+              <a:off x="5900928" y="1005078"/>
+              <a:ext cx="707136" cy="305562"/>
+            </a:xfrm>
+            <a:prstGeom prst="rect">
+              <a:avLst/>
+            </a:prstGeom>
+            <a:solidFill>
+              <a:schemeClr val="bg1">
+                <a:lumMod val="65000"/>
+              </a:schemeClr>
+            </a:solidFill>
+            <a:ln>
+              <a:noFill/>
+            </a:ln>
+          </p:spPr>
+          <p:style>
+            <a:lnRef idx="2">
+              <a:schemeClr val="accent1">
+                <a:shade val="50000"/>
+              </a:schemeClr>
+            </a:lnRef>
+            <a:fillRef idx="1">
+              <a:schemeClr val="accent1"/>
+            </a:fillRef>
+            <a:effectRef idx="0">
+              <a:schemeClr val="accent1"/>
+            </a:effectRef>
+            <a:fontRef idx="minor">
+              <a:schemeClr val="lt1"/>
+            </a:fontRef>
+          </p:style>
+          <p:txBody>
+            <a:bodyPr rtlCol="0" anchor="ctr"/>
+            <a:lstStyle/>
+            <a:p>
+              <a:r>
+                <a:rPr lang="en-US" altLang="zh-CN" sz="1050" dirty="0"/>
+                <a:t>Email</a:t>
+              </a:r>
+              <a:endParaRPr lang="en-MY" sz="1050" dirty="0"/>
+            </a:p>
+          </p:txBody>
+        </p:sp>
+        <p:sp>
+          <p:nvSpPr>
+            <p:cNvPr id="2" name="Rectangle: Rounded Corners 1">
+              <a:extLst>
+                <a:ext uri="{FF2B5EF4-FFF2-40B4-BE49-F238E27FC236}">
+                  <a16:creationId xmlns:a16="http://schemas.microsoft.com/office/drawing/2014/main" id="{75331428-03E1-4D46-AE6F-9057DAD73F0E}"/>
+                </a:ext>
+              </a:extLst>
+            </p:cNvPr>
+            <p:cNvSpPr/>
+            <p:nvPr/>
+          </p:nvSpPr>
+          <p:spPr>
+            <a:xfrm>
+              <a:off x="6608064" y="1043559"/>
+              <a:ext cx="1828800" cy="228600"/>
+            </a:xfrm>
+            <a:prstGeom prst="roundRect">
+              <a:avLst/>
+            </a:prstGeom>
+            <a:solidFill>
+              <a:schemeClr val="bg1"/>
+            </a:solidFill>
+            <a:ln>
+              <a:solidFill>
+                <a:schemeClr val="tx1"/>
+              </a:solidFill>
+            </a:ln>
+          </p:spPr>
+          <p:style>
+            <a:lnRef idx="2">
+              <a:schemeClr val="accent1">
+                <a:shade val="50000"/>
+              </a:schemeClr>
+            </a:lnRef>
+            <a:fillRef idx="1">
+              <a:schemeClr val="accent1"/>
+            </a:fillRef>
+            <a:effectRef idx="0">
+              <a:schemeClr val="accent1"/>
+            </a:effectRef>
+            <a:fontRef idx="minor">
+              <a:schemeClr val="lt1"/>
+            </a:fontRef>
+          </p:style>
+          <p:txBody>
+            <a:bodyPr rtlCol="0" anchor="t"/>
+            <a:lstStyle/>
+            <a:p>
+              <a:r>
+                <a:rPr lang="en-US" sz="800" dirty="0">
+                  <a:solidFill>
+                    <a:sysClr val="windowText" lastClr="000000"/>
+                  </a:solidFill>
+                </a:rPr>
+                <a:t>wong.zhengquan@gmail.com</a:t>
+              </a:r>
+              <a:endParaRPr lang="en-MY" sz="800" dirty="0">
+                <a:solidFill>
+                  <a:sysClr val="windowText" lastClr="000000"/>
+                </a:solidFill>
+              </a:endParaRPr>
+            </a:p>
+          </p:txBody>
+        </p:sp>
+      </p:grpSp>
+      <p:grpSp>
+        <p:nvGrpSpPr>
+          <p:cNvPr id="55" name="Group 54">
+            <a:extLst>
+              <a:ext uri="{FF2B5EF4-FFF2-40B4-BE49-F238E27FC236}">
+                <a16:creationId xmlns:a16="http://schemas.microsoft.com/office/drawing/2014/main" id="{D9885AB1-81DD-41AE-BE72-DBD37F6D9AB3}"/>
+              </a:ext>
+            </a:extLst>
+          </p:cNvPr>
+          <p:cNvGrpSpPr/>
+          <p:nvPr/>
+        </p:nvGrpSpPr>
+        <p:grpSpPr>
+          <a:xfrm>
+            <a:off x="5900928" y="1360487"/>
+            <a:ext cx="2535936" cy="305562"/>
+            <a:chOff x="5900928" y="1005078"/>
+            <a:chExt cx="2535936" cy="305562"/>
+          </a:xfrm>
+        </p:grpSpPr>
+        <p:sp>
+          <p:nvSpPr>
+            <p:cNvPr id="56" name="Rectangle 55">
+              <a:extLst>
+                <a:ext uri="{FF2B5EF4-FFF2-40B4-BE49-F238E27FC236}">
+                  <a16:creationId xmlns:a16="http://schemas.microsoft.com/office/drawing/2014/main" id="{A91EB03C-A2DF-43D6-B189-E8A385971520}"/>
+                </a:ext>
+              </a:extLst>
+            </p:cNvPr>
+            <p:cNvSpPr/>
+            <p:nvPr/>
+          </p:nvSpPr>
+          <p:spPr>
+            <a:xfrm>
+              <a:off x="5900928" y="1005078"/>
+              <a:ext cx="707136" cy="305562"/>
+            </a:xfrm>
+            <a:prstGeom prst="rect">
+              <a:avLst/>
+            </a:prstGeom>
+            <a:solidFill>
+              <a:schemeClr val="bg1">
+                <a:lumMod val="65000"/>
+              </a:schemeClr>
+            </a:solidFill>
+            <a:ln>
+              <a:noFill/>
+            </a:ln>
+          </p:spPr>
+          <p:style>
+            <a:lnRef idx="2">
+              <a:schemeClr val="accent1">
+                <a:shade val="50000"/>
+              </a:schemeClr>
+            </a:lnRef>
+            <a:fillRef idx="1">
+              <a:schemeClr val="accent1"/>
+            </a:fillRef>
+            <a:effectRef idx="0">
+              <a:schemeClr val="accent1"/>
+            </a:effectRef>
+            <a:fontRef idx="minor">
+              <a:schemeClr val="lt1"/>
+            </a:fontRef>
+          </p:style>
+          <p:txBody>
+            <a:bodyPr rtlCol="0" anchor="ctr"/>
+            <a:lstStyle/>
+            <a:p>
+              <a:r>
+                <a:rPr lang="en-US" altLang="zh-CN" sz="1050" dirty="0"/>
+                <a:t>Name</a:t>
+              </a:r>
+              <a:endParaRPr lang="en-MY" sz="1050" dirty="0"/>
+            </a:p>
+          </p:txBody>
+        </p:sp>
+        <p:sp>
+          <p:nvSpPr>
+            <p:cNvPr id="57" name="Rectangle: Rounded Corners 56">
+              <a:extLst>
+                <a:ext uri="{FF2B5EF4-FFF2-40B4-BE49-F238E27FC236}">
+                  <a16:creationId xmlns:a16="http://schemas.microsoft.com/office/drawing/2014/main" id="{22435E25-7E4B-40F1-B4A3-2B9B021D364F}"/>
+                </a:ext>
+              </a:extLst>
+            </p:cNvPr>
+            <p:cNvSpPr/>
+            <p:nvPr/>
+          </p:nvSpPr>
+          <p:spPr>
+            <a:xfrm>
+              <a:off x="6608064" y="1043559"/>
+              <a:ext cx="1828800" cy="228600"/>
+            </a:xfrm>
+            <a:prstGeom prst="roundRect">
+              <a:avLst/>
+            </a:prstGeom>
+            <a:solidFill>
+              <a:schemeClr val="bg1"/>
+            </a:solidFill>
+            <a:ln>
+              <a:solidFill>
+                <a:schemeClr val="tx1"/>
+              </a:solidFill>
+            </a:ln>
+          </p:spPr>
+          <p:style>
+            <a:lnRef idx="2">
+              <a:schemeClr val="accent1">
+                <a:shade val="50000"/>
+              </a:schemeClr>
+            </a:lnRef>
+            <a:fillRef idx="1">
+              <a:schemeClr val="accent1"/>
+            </a:fillRef>
+            <a:effectRef idx="0">
+              <a:schemeClr val="accent1"/>
+            </a:effectRef>
+            <a:fontRef idx="minor">
+              <a:schemeClr val="lt1"/>
+            </a:fontRef>
+          </p:style>
+          <p:txBody>
+            <a:bodyPr rtlCol="0" anchor="t"/>
+            <a:lstStyle/>
+            <a:p>
+              <a:r>
+                <a:rPr lang="en-US" sz="800" dirty="0">
+                  <a:solidFill>
+                    <a:sysClr val="windowText" lastClr="000000"/>
+                  </a:solidFill>
+                </a:rPr>
+                <a:t>Wong Zheng Quan</a:t>
+              </a:r>
+              <a:endParaRPr lang="en-MY" sz="800" dirty="0">
+                <a:solidFill>
+                  <a:sysClr val="windowText" lastClr="000000"/>
+                </a:solidFill>
+              </a:endParaRPr>
+            </a:p>
+          </p:txBody>
+        </p:sp>
+      </p:grpSp>
+      <p:sp>
+        <p:nvSpPr>
+          <p:cNvPr id="59" name="Rectangle 58">
+            <a:extLst>
+              <a:ext uri="{FF2B5EF4-FFF2-40B4-BE49-F238E27FC236}">
+                <a16:creationId xmlns:a16="http://schemas.microsoft.com/office/drawing/2014/main" id="{695AC27C-BEE7-4A3F-83DD-150C090D6DBF}"/>
+              </a:ext>
+            </a:extLst>
+          </p:cNvPr>
+          <p:cNvSpPr/>
+          <p:nvPr/>
+        </p:nvSpPr>
+        <p:spPr>
+          <a:xfrm>
+            <a:off x="5900928" y="1715896"/>
+            <a:ext cx="707136" cy="305562"/>
+          </a:xfrm>
+          <a:prstGeom prst="rect">
+            <a:avLst/>
+          </a:prstGeom>
+          <a:solidFill>
+            <a:schemeClr val="bg1">
+              <a:lumMod val="65000"/>
+            </a:schemeClr>
+          </a:solidFill>
+          <a:ln>
+            <a:noFill/>
+          </a:ln>
+        </p:spPr>
+        <p:style>
+          <a:lnRef idx="2">
+            <a:schemeClr val="accent1">
+              <a:shade val="50000"/>
+            </a:schemeClr>
+          </a:lnRef>
+          <a:fillRef idx="1">
+            <a:schemeClr val="accent1"/>
+          </a:fillRef>
+          <a:effectRef idx="0">
+            <a:schemeClr val="accent1"/>
+          </a:effectRef>
+          <a:fontRef idx="minor">
+            <a:schemeClr val="lt1"/>
+          </a:fontRef>
+        </p:style>
+        <p:txBody>
+          <a:bodyPr rtlCol="0" anchor="ctr"/>
+          <a:lstStyle/>
+          <a:p>
+            <a:r>
+              <a:rPr lang="en-US" altLang="zh-CN" sz="1050" dirty="0"/>
+              <a:t>Colour</a:t>
+            </a:r>
+            <a:endParaRPr lang="en-MY" sz="1050" dirty="0"/>
+          </a:p>
+        </p:txBody>
+      </p:sp>
+      <p:grpSp>
+        <p:nvGrpSpPr>
+          <p:cNvPr id="20" name="Group 19">
+            <a:extLst>
+              <a:ext uri="{FF2B5EF4-FFF2-40B4-BE49-F238E27FC236}">
+                <a16:creationId xmlns:a16="http://schemas.microsoft.com/office/drawing/2014/main" id="{1DDC1E90-B5D7-4D7C-907C-D16D79A86C53}"/>
+              </a:ext>
+            </a:extLst>
+          </p:cNvPr>
+          <p:cNvGrpSpPr/>
+          <p:nvPr/>
+        </p:nvGrpSpPr>
+        <p:grpSpPr>
+          <a:xfrm>
+            <a:off x="6608064" y="1807717"/>
+            <a:ext cx="1828800" cy="121920"/>
+            <a:chOff x="6608064" y="1807717"/>
+            <a:chExt cx="1828800" cy="121920"/>
+          </a:xfrm>
+        </p:grpSpPr>
+        <p:sp>
+          <p:nvSpPr>
+            <p:cNvPr id="60" name="Rectangle: Rounded Corners 59">
+              <a:extLst>
+                <a:ext uri="{FF2B5EF4-FFF2-40B4-BE49-F238E27FC236}">
+                  <a16:creationId xmlns:a16="http://schemas.microsoft.com/office/drawing/2014/main" id="{30CEE25C-D85C-41A3-B06D-86E183FF42D0}"/>
+                </a:ext>
+              </a:extLst>
+            </p:cNvPr>
+            <p:cNvSpPr/>
+            <p:nvPr/>
+          </p:nvSpPr>
+          <p:spPr>
+            <a:xfrm>
+              <a:off x="6608064" y="1845817"/>
+              <a:ext cx="1828800" cy="45720"/>
+            </a:xfrm>
+            <a:prstGeom prst="roundRect">
+              <a:avLst/>
+            </a:prstGeom>
+            <a:gradFill>
+              <a:gsLst>
+                <a:gs pos="88000">
+                  <a:srgbClr val="002060"/>
+                </a:gs>
+                <a:gs pos="77000">
+                  <a:srgbClr val="0070C0"/>
+                </a:gs>
+                <a:gs pos="66000">
+                  <a:srgbClr val="00B0F0"/>
+                </a:gs>
+                <a:gs pos="55000">
+                  <a:srgbClr val="00B050"/>
+                </a:gs>
+                <a:gs pos="44000">
+                  <a:srgbClr val="92D050"/>
+                </a:gs>
+                <a:gs pos="33000">
+                  <a:srgbClr val="FFFF00"/>
+                </a:gs>
+                <a:gs pos="22000">
+                  <a:srgbClr val="FFC000"/>
+                </a:gs>
+                <a:gs pos="11000">
+                  <a:srgbClr val="FF0000"/>
+                </a:gs>
+                <a:gs pos="0">
+                  <a:srgbClr val="C00000"/>
+                </a:gs>
+                <a:gs pos="100000">
+                  <a:srgbClr val="7030A0"/>
+                </a:gs>
+              </a:gsLst>
+              <a:lin ang="0" scaled="0"/>
+            </a:gradFill>
+            <a:ln>
+              <a:noFill/>
+            </a:ln>
+          </p:spPr>
+          <p:style>
+            <a:lnRef idx="2">
+              <a:schemeClr val="accent1">
+                <a:shade val="50000"/>
+              </a:schemeClr>
+            </a:lnRef>
+            <a:fillRef idx="1">
+              <a:schemeClr val="accent1"/>
+            </a:fillRef>
+            <a:effectRef idx="0">
+              <a:schemeClr val="accent1"/>
+            </a:effectRef>
+            <a:fontRef idx="minor">
+              <a:schemeClr val="lt1"/>
+            </a:fontRef>
+          </p:style>
+          <p:txBody>
+            <a:bodyPr rtlCol="0" anchor="ctr"/>
+            <a:lstStyle/>
+            <a:p>
+              <a:pPr algn="ctr"/>
+              <a:endParaRPr lang="en-US" noProof="1"/>
+            </a:p>
+          </p:txBody>
+        </p:sp>
+        <p:sp>
+          <p:nvSpPr>
+            <p:cNvPr id="8" name="Oval 7">
+              <a:extLst>
+                <a:ext uri="{FF2B5EF4-FFF2-40B4-BE49-F238E27FC236}">
+                  <a16:creationId xmlns:a16="http://schemas.microsoft.com/office/drawing/2014/main" id="{939953B7-F810-451B-BEE5-BF6288536928}"/>
+                </a:ext>
+              </a:extLst>
+            </p:cNvPr>
+            <p:cNvSpPr/>
+            <p:nvPr/>
+          </p:nvSpPr>
+          <p:spPr>
+            <a:xfrm>
+              <a:off x="7461504" y="1807717"/>
+              <a:ext cx="121920" cy="121920"/>
+            </a:xfrm>
+            <a:prstGeom prst="ellipse">
+              <a:avLst/>
+            </a:prstGeom>
+            <a:solidFill>
+              <a:srgbClr val="92D050"/>
+            </a:solidFill>
+            <a:ln>
+              <a:noFill/>
+            </a:ln>
+            <a:effectLst>
+              <a:outerShdw blurRad="63500" sx="102000" sy="102000" algn="ctr" rotWithShape="0">
+                <a:prstClr val="black">
+                  <a:alpha val="40000"/>
+                </a:prstClr>
+              </a:outerShdw>
+            </a:effectLst>
+          </p:spPr>
+          <p:style>
+            <a:lnRef idx="2">
+              <a:schemeClr val="accent1">
+                <a:shade val="50000"/>
+              </a:schemeClr>
+            </a:lnRef>
+            <a:fillRef idx="1">
+              <a:schemeClr val="accent1"/>
+            </a:fillRef>
+            <a:effectRef idx="0">
+              <a:schemeClr val="accent1"/>
+            </a:effectRef>
+            <a:fontRef idx="minor">
+              <a:schemeClr val="lt1"/>
+            </a:fontRef>
+          </p:style>
+          <p:txBody>
+            <a:bodyPr rtlCol="0" anchor="ctr"/>
+            <a:lstStyle/>
+            <a:p>
+              <a:pPr algn="ctr"/>
+              <a:endParaRPr lang="en-US" noProof="1"/>
+            </a:p>
+          </p:txBody>
+        </p:sp>
+      </p:grpSp>
+      <p:grpSp>
+        <p:nvGrpSpPr>
+          <p:cNvPr id="63" name="Group 62">
+            <a:extLst>
+              <a:ext uri="{FF2B5EF4-FFF2-40B4-BE49-F238E27FC236}">
+                <a16:creationId xmlns:a16="http://schemas.microsoft.com/office/drawing/2014/main" id="{507B4C83-7431-46A9-B87D-8BB5F5956609}"/>
+              </a:ext>
+            </a:extLst>
+          </p:cNvPr>
+          <p:cNvGrpSpPr/>
+          <p:nvPr/>
+        </p:nvGrpSpPr>
+        <p:grpSpPr>
+          <a:xfrm>
+            <a:off x="8101584" y="4427379"/>
+            <a:ext cx="426720" cy="426720"/>
+            <a:chOff x="7237984" y="3429000"/>
+            <a:chExt cx="426720" cy="426720"/>
+          </a:xfrm>
+        </p:grpSpPr>
+        <p:sp>
+          <p:nvSpPr>
+            <p:cNvPr id="61" name="Oval 60">
+              <a:extLst>
+                <a:ext uri="{FF2B5EF4-FFF2-40B4-BE49-F238E27FC236}">
+                  <a16:creationId xmlns:a16="http://schemas.microsoft.com/office/drawing/2014/main" id="{9BC65674-1A47-42E0-8B13-22A255A6E35C}"/>
+                </a:ext>
+              </a:extLst>
+            </p:cNvPr>
+            <p:cNvSpPr/>
+            <p:nvPr/>
+          </p:nvSpPr>
+          <p:spPr>
+            <a:xfrm>
+              <a:off x="7237984" y="3429000"/>
+              <a:ext cx="426720" cy="426720"/>
+            </a:xfrm>
+            <a:prstGeom prst="ellipse">
+              <a:avLst/>
+            </a:prstGeom>
+            <a:solidFill>
+              <a:schemeClr val="tx1"/>
+            </a:solidFill>
+            <a:ln>
+              <a:noFill/>
+            </a:ln>
+          </p:spPr>
+          <p:style>
+            <a:lnRef idx="2">
+              <a:schemeClr val="accent1">
+                <a:shade val="50000"/>
+              </a:schemeClr>
+            </a:lnRef>
+            <a:fillRef idx="1">
+              <a:schemeClr val="accent1"/>
+            </a:fillRef>
+            <a:effectRef idx="0">
+              <a:schemeClr val="accent1"/>
+            </a:effectRef>
+            <a:fontRef idx="minor">
+              <a:schemeClr val="lt1"/>
+            </a:fontRef>
+          </p:style>
+          <p:txBody>
+            <a:bodyPr rtlCol="0" anchor="ctr"/>
+            <a:lstStyle/>
+            <a:p>
+              <a:pPr algn="ctr"/>
+              <a:endParaRPr lang="en-MY"/>
+            </a:p>
+          </p:txBody>
+        </p:sp>
+        <p:sp>
+          <p:nvSpPr>
+            <p:cNvPr id="62" name="Cross 61">
+              <a:extLst>
+                <a:ext uri="{FF2B5EF4-FFF2-40B4-BE49-F238E27FC236}">
+                  <a16:creationId xmlns:a16="http://schemas.microsoft.com/office/drawing/2014/main" id="{91DCEE0B-82C9-4AFA-9D41-6556A2EEC01D}"/>
+                </a:ext>
+              </a:extLst>
+            </p:cNvPr>
+            <p:cNvSpPr/>
+            <p:nvPr/>
+          </p:nvSpPr>
+          <p:spPr>
+            <a:xfrm>
+              <a:off x="7344664" y="3535680"/>
+              <a:ext cx="213360" cy="213360"/>
+            </a:xfrm>
+            <a:prstGeom prst="plus">
+              <a:avLst>
+                <a:gd name="adj" fmla="val 41071"/>
+              </a:avLst>
+            </a:prstGeom>
+            <a:solidFill>
+              <a:schemeClr val="bg1"/>
+            </a:solidFill>
+            <a:ln>
+              <a:noFill/>
+            </a:ln>
+          </p:spPr>
+          <p:style>
+            <a:lnRef idx="2">
+              <a:schemeClr val="accent1">
+                <a:shade val="50000"/>
+              </a:schemeClr>
+            </a:lnRef>
+            <a:fillRef idx="1">
+              <a:schemeClr val="accent1"/>
+            </a:fillRef>
+            <a:effectRef idx="0">
+              <a:schemeClr val="accent1"/>
+            </a:effectRef>
+            <a:fontRef idx="minor">
+              <a:schemeClr val="lt1"/>
+            </a:fontRef>
+          </p:style>
+          <p:txBody>
+            <a:bodyPr rtlCol="0" anchor="ctr"/>
+            <a:lstStyle/>
+            <a:p>
+              <a:pPr algn="ctr"/>
+              <a:endParaRPr lang="en-MY"/>
+            </a:p>
+          </p:txBody>
+        </p:sp>
+      </p:grpSp>
+      <p:grpSp>
+        <p:nvGrpSpPr>
+          <p:cNvPr id="84" name="Group 83">
+            <a:extLst>
+              <a:ext uri="{FF2B5EF4-FFF2-40B4-BE49-F238E27FC236}">
+                <a16:creationId xmlns:a16="http://schemas.microsoft.com/office/drawing/2014/main" id="{0FC02049-EE74-4B73-AA03-ED802C505B55}"/>
+              </a:ext>
+            </a:extLst>
+          </p:cNvPr>
+          <p:cNvGrpSpPr/>
+          <p:nvPr/>
+        </p:nvGrpSpPr>
+        <p:grpSpPr>
+          <a:xfrm>
+            <a:off x="9787508" y="502158"/>
+            <a:ext cx="1836421" cy="1828800"/>
+            <a:chOff x="9787508" y="502158"/>
+            <a:chExt cx="1836421" cy="1676396"/>
+          </a:xfrm>
+        </p:grpSpPr>
+        <p:grpSp>
+          <p:nvGrpSpPr>
+            <p:cNvPr id="80" name="Group 79">
+              <a:extLst>
+                <a:ext uri="{FF2B5EF4-FFF2-40B4-BE49-F238E27FC236}">
+                  <a16:creationId xmlns:a16="http://schemas.microsoft.com/office/drawing/2014/main" id="{F5EC1E60-1EF0-49AB-87ED-99D380D1A160}"/>
+                </a:ext>
+              </a:extLst>
+            </p:cNvPr>
+            <p:cNvGrpSpPr/>
+            <p:nvPr/>
+          </p:nvGrpSpPr>
+          <p:grpSpPr>
+            <a:xfrm>
+              <a:off x="9787509" y="502158"/>
+              <a:ext cx="1836419" cy="365760"/>
+              <a:chOff x="9787509" y="502158"/>
+              <a:chExt cx="1836419" cy="365760"/>
+            </a:xfrm>
+            <a:solidFill>
+              <a:srgbClr val="FF5050"/>
+            </a:solidFill>
+          </p:grpSpPr>
+          <p:sp>
+            <p:nvSpPr>
+              <p:cNvPr id="64" name="Rectangle 63">
+                <a:extLst>
+                  <a:ext uri="{FF2B5EF4-FFF2-40B4-BE49-F238E27FC236}">
+                    <a16:creationId xmlns:a16="http://schemas.microsoft.com/office/drawing/2014/main" id="{0826B2D7-316C-44B9-B03D-461C08B38E65}"/>
+                  </a:ext>
+                </a:extLst>
+              </p:cNvPr>
+              <p:cNvSpPr/>
+              <p:nvPr/>
+            </p:nvSpPr>
+            <p:spPr>
+              <a:xfrm>
+                <a:off x="10189845" y="502158"/>
+                <a:ext cx="1434083" cy="365760"/>
+              </a:xfrm>
+              <a:prstGeom prst="rect">
+                <a:avLst/>
+              </a:prstGeom>
+              <a:grpFill/>
+              <a:ln>
+                <a:noFill/>
+              </a:ln>
+            </p:spPr>
+            <p:style>
+              <a:lnRef idx="2">
+                <a:schemeClr val="accent1">
+                  <a:shade val="50000"/>
+                </a:schemeClr>
+              </a:lnRef>
+              <a:fillRef idx="1">
+                <a:schemeClr val="accent1"/>
+              </a:fillRef>
+              <a:effectRef idx="0">
+                <a:schemeClr val="accent1"/>
+              </a:effectRef>
+              <a:fontRef idx="minor">
+                <a:schemeClr val="lt1"/>
+              </a:fontRef>
+            </p:style>
+            <p:txBody>
+              <a:bodyPr rtlCol="0" anchor="ctr"/>
+              <a:lstStyle/>
+              <a:p>
+                <a:pPr algn="ctr"/>
+                <a:endParaRPr lang="en-MY"/>
+              </a:p>
+            </p:txBody>
+          </p:sp>
+          <p:sp>
+            <p:nvSpPr>
+              <p:cNvPr id="65" name="Isosceles Triangle 64">
+                <a:extLst>
+                  <a:ext uri="{FF2B5EF4-FFF2-40B4-BE49-F238E27FC236}">
+                    <a16:creationId xmlns:a16="http://schemas.microsoft.com/office/drawing/2014/main" id="{7C3B4C85-55C1-485B-A3C3-C8B69B92B1E0}"/>
+                  </a:ext>
+                </a:extLst>
+              </p:cNvPr>
+              <p:cNvSpPr/>
+              <p:nvPr/>
+            </p:nvSpPr>
+            <p:spPr>
+              <a:xfrm>
+                <a:off x="9787509" y="502158"/>
+                <a:ext cx="402336" cy="365760"/>
+              </a:xfrm>
+              <a:prstGeom prst="triangle">
+                <a:avLst>
+                  <a:gd name="adj" fmla="val 100000"/>
+                </a:avLst>
+              </a:prstGeom>
+              <a:grpFill/>
+              <a:ln>
+                <a:noFill/>
+              </a:ln>
+            </p:spPr>
+            <p:style>
+              <a:lnRef idx="2">
+                <a:schemeClr val="accent1">
+                  <a:shade val="50000"/>
+                </a:schemeClr>
+              </a:lnRef>
+              <a:fillRef idx="1">
+                <a:schemeClr val="accent1"/>
+              </a:fillRef>
+              <a:effectRef idx="0">
+                <a:schemeClr val="accent1"/>
+              </a:effectRef>
+              <a:fontRef idx="minor">
+                <a:schemeClr val="lt1"/>
+              </a:fontRef>
+            </p:style>
+            <p:txBody>
+              <a:bodyPr rtlCol="0" anchor="ctr"/>
+              <a:lstStyle/>
+              <a:p>
+                <a:pPr algn="ctr"/>
+                <a:endParaRPr lang="en-MY"/>
+              </a:p>
+            </p:txBody>
+          </p:sp>
+        </p:grpSp>
+        <p:grpSp>
+          <p:nvGrpSpPr>
+            <p:cNvPr id="81" name="Group 80">
+              <a:extLst>
+                <a:ext uri="{FF2B5EF4-FFF2-40B4-BE49-F238E27FC236}">
+                  <a16:creationId xmlns:a16="http://schemas.microsoft.com/office/drawing/2014/main" id="{95049701-926A-4857-A63C-92F832138121}"/>
+                </a:ext>
+              </a:extLst>
+            </p:cNvPr>
+            <p:cNvGrpSpPr/>
+            <p:nvPr/>
+          </p:nvGrpSpPr>
+          <p:grpSpPr>
+            <a:xfrm>
+              <a:off x="9787508" y="939037"/>
+              <a:ext cx="1280161" cy="365760"/>
+              <a:chOff x="9787508" y="939037"/>
+              <a:chExt cx="1280161" cy="365760"/>
+            </a:xfrm>
+            <a:solidFill>
+              <a:srgbClr val="FFFF66"/>
+            </a:solidFill>
+          </p:grpSpPr>
+          <p:sp>
+            <p:nvSpPr>
+              <p:cNvPr id="68" name="Rectangle 67">
+                <a:extLst>
+                  <a:ext uri="{FF2B5EF4-FFF2-40B4-BE49-F238E27FC236}">
+                    <a16:creationId xmlns:a16="http://schemas.microsoft.com/office/drawing/2014/main" id="{5E295388-206F-4E08-8668-4A1DF637D8C5}"/>
+                  </a:ext>
+                </a:extLst>
+              </p:cNvPr>
+              <p:cNvSpPr/>
+              <p:nvPr/>
+            </p:nvSpPr>
+            <p:spPr>
+              <a:xfrm rot="10800000">
+                <a:off x="9787508" y="939037"/>
+                <a:ext cx="877824" cy="365760"/>
+              </a:xfrm>
+              <a:prstGeom prst="rect">
+                <a:avLst/>
+              </a:prstGeom>
+              <a:grpFill/>
+              <a:ln>
+                <a:noFill/>
+              </a:ln>
+            </p:spPr>
+            <p:style>
+              <a:lnRef idx="2">
+                <a:schemeClr val="accent1">
+                  <a:shade val="50000"/>
+                </a:schemeClr>
+              </a:lnRef>
+              <a:fillRef idx="1">
+                <a:schemeClr val="accent1"/>
+              </a:fillRef>
+              <a:effectRef idx="0">
+                <a:schemeClr val="accent1"/>
+              </a:effectRef>
+              <a:fontRef idx="minor">
+                <a:schemeClr val="lt1"/>
+              </a:fontRef>
+            </p:style>
+            <p:txBody>
+              <a:bodyPr rtlCol="0" anchor="ctr"/>
+              <a:lstStyle/>
+              <a:p>
+                <a:pPr algn="ctr"/>
+                <a:endParaRPr lang="en-MY"/>
+              </a:p>
+            </p:txBody>
+          </p:sp>
+          <p:sp>
+            <p:nvSpPr>
+              <p:cNvPr id="69" name="Isosceles Triangle 68">
+                <a:extLst>
+                  <a:ext uri="{FF2B5EF4-FFF2-40B4-BE49-F238E27FC236}">
+                    <a16:creationId xmlns:a16="http://schemas.microsoft.com/office/drawing/2014/main" id="{640450F5-A76B-4E2A-919E-1213E864D379}"/>
+                  </a:ext>
+                </a:extLst>
+              </p:cNvPr>
+              <p:cNvSpPr/>
+              <p:nvPr/>
+            </p:nvSpPr>
+            <p:spPr>
+              <a:xfrm rot="10800000">
+                <a:off x="10665333" y="939037"/>
+                <a:ext cx="402336" cy="365760"/>
+              </a:xfrm>
+              <a:prstGeom prst="triangle">
+                <a:avLst>
+                  <a:gd name="adj" fmla="val 100000"/>
+                </a:avLst>
+              </a:prstGeom>
+              <a:grpFill/>
+              <a:ln>
+                <a:noFill/>
+              </a:ln>
+            </p:spPr>
+            <p:style>
+              <a:lnRef idx="2">
+                <a:schemeClr val="accent1">
+                  <a:shade val="50000"/>
+                </a:schemeClr>
+              </a:lnRef>
+              <a:fillRef idx="1">
+                <a:schemeClr val="accent1"/>
+              </a:fillRef>
+              <a:effectRef idx="0">
+                <a:schemeClr val="accent1"/>
+              </a:effectRef>
+              <a:fontRef idx="minor">
+                <a:schemeClr val="lt1"/>
+              </a:fontRef>
+            </p:style>
+            <p:txBody>
+              <a:bodyPr rtlCol="0" anchor="ctr"/>
+              <a:lstStyle/>
+              <a:p>
+                <a:pPr algn="ctr"/>
+                <a:endParaRPr lang="en-MY"/>
+              </a:p>
+            </p:txBody>
+          </p:sp>
+        </p:grpSp>
+        <p:grpSp>
+          <p:nvGrpSpPr>
+            <p:cNvPr id="83" name="Group 82">
+              <a:extLst>
+                <a:ext uri="{FF2B5EF4-FFF2-40B4-BE49-F238E27FC236}">
+                  <a16:creationId xmlns:a16="http://schemas.microsoft.com/office/drawing/2014/main" id="{E7C28038-A65B-4D0C-AB01-6C6B0D25EB3E}"/>
+                </a:ext>
+              </a:extLst>
+            </p:cNvPr>
+            <p:cNvGrpSpPr/>
+            <p:nvPr/>
+          </p:nvGrpSpPr>
+          <p:grpSpPr>
+            <a:xfrm>
+              <a:off x="9787508" y="1812794"/>
+              <a:ext cx="1836421" cy="365760"/>
+              <a:chOff x="9787508" y="1812794"/>
+              <a:chExt cx="1836421" cy="365760"/>
+            </a:xfrm>
+            <a:solidFill>
+              <a:srgbClr val="66CCFF"/>
+            </a:solidFill>
+          </p:grpSpPr>
+          <p:sp>
+            <p:nvSpPr>
+              <p:cNvPr id="74" name="Rectangle 73">
+                <a:extLst>
+                  <a:ext uri="{FF2B5EF4-FFF2-40B4-BE49-F238E27FC236}">
+                    <a16:creationId xmlns:a16="http://schemas.microsoft.com/office/drawing/2014/main" id="{3CE06233-7306-4D25-BE51-6FC7881AC3C9}"/>
+                  </a:ext>
+                </a:extLst>
+              </p:cNvPr>
+              <p:cNvSpPr/>
+              <p:nvPr/>
+            </p:nvSpPr>
+            <p:spPr>
+              <a:xfrm rot="10800000">
+                <a:off x="9787508" y="1812794"/>
+                <a:ext cx="1434084" cy="365760"/>
+              </a:xfrm>
+              <a:prstGeom prst="rect">
+                <a:avLst/>
+              </a:prstGeom>
+              <a:grpFill/>
+              <a:ln>
+                <a:noFill/>
+              </a:ln>
+            </p:spPr>
+            <p:style>
+              <a:lnRef idx="2">
+                <a:schemeClr val="accent1">
+                  <a:shade val="50000"/>
+                </a:schemeClr>
+              </a:lnRef>
+              <a:fillRef idx="1">
+                <a:schemeClr val="accent1"/>
+              </a:fillRef>
+              <a:effectRef idx="0">
+                <a:schemeClr val="accent1"/>
+              </a:effectRef>
+              <a:fontRef idx="minor">
+                <a:schemeClr val="lt1"/>
+              </a:fontRef>
+            </p:style>
+            <p:txBody>
+              <a:bodyPr rtlCol="0" anchor="ctr"/>
+              <a:lstStyle/>
+              <a:p>
+                <a:pPr algn="ctr"/>
+                <a:endParaRPr lang="en-MY"/>
+              </a:p>
+            </p:txBody>
+          </p:sp>
+          <p:sp>
+            <p:nvSpPr>
+              <p:cNvPr id="75" name="Isosceles Triangle 74">
+                <a:extLst>
+                  <a:ext uri="{FF2B5EF4-FFF2-40B4-BE49-F238E27FC236}">
+                    <a16:creationId xmlns:a16="http://schemas.microsoft.com/office/drawing/2014/main" id="{DA5C005A-0E58-465E-A186-255891CEA102}"/>
+                  </a:ext>
+                </a:extLst>
+              </p:cNvPr>
+              <p:cNvSpPr/>
+              <p:nvPr/>
+            </p:nvSpPr>
+            <p:spPr>
+              <a:xfrm rot="10800000">
+                <a:off x="11221593" y="1812794"/>
+                <a:ext cx="402336" cy="365760"/>
+              </a:xfrm>
+              <a:prstGeom prst="triangle">
+                <a:avLst>
+                  <a:gd name="adj" fmla="val 100000"/>
+                </a:avLst>
+              </a:prstGeom>
+              <a:grpFill/>
+              <a:ln>
+                <a:noFill/>
+              </a:ln>
+            </p:spPr>
+            <p:style>
+              <a:lnRef idx="2">
+                <a:schemeClr val="accent1">
+                  <a:shade val="50000"/>
+                </a:schemeClr>
+              </a:lnRef>
+              <a:fillRef idx="1">
+                <a:schemeClr val="accent1"/>
+              </a:fillRef>
+              <a:effectRef idx="0">
+                <a:schemeClr val="accent1"/>
+              </a:effectRef>
+              <a:fontRef idx="minor">
+                <a:schemeClr val="lt1"/>
+              </a:fontRef>
+            </p:style>
+            <p:txBody>
+              <a:bodyPr rtlCol="0" anchor="ctr"/>
+              <a:lstStyle/>
+              <a:p>
+                <a:pPr algn="ctr"/>
+                <a:endParaRPr lang="en-MY"/>
+              </a:p>
+            </p:txBody>
+          </p:sp>
+        </p:grpSp>
+        <p:grpSp>
+          <p:nvGrpSpPr>
+            <p:cNvPr id="82" name="Group 81">
+              <a:extLst>
+                <a:ext uri="{FF2B5EF4-FFF2-40B4-BE49-F238E27FC236}">
+                  <a16:creationId xmlns:a16="http://schemas.microsoft.com/office/drawing/2014/main" id="{6DC332B3-754D-4D96-BAEF-A1013837B838}"/>
+                </a:ext>
+              </a:extLst>
+            </p:cNvPr>
+            <p:cNvGrpSpPr/>
+            <p:nvPr/>
+          </p:nvGrpSpPr>
+          <p:grpSpPr>
+            <a:xfrm>
+              <a:off x="10343007" y="1375915"/>
+              <a:ext cx="1280921" cy="365760"/>
+              <a:chOff x="10343007" y="1375915"/>
+              <a:chExt cx="1280921" cy="365760"/>
+            </a:xfrm>
+            <a:solidFill>
+              <a:srgbClr val="00FFCC"/>
+            </a:solidFill>
+          </p:grpSpPr>
+          <p:sp>
+            <p:nvSpPr>
+              <p:cNvPr id="71" name="Rectangle 70">
+                <a:extLst>
+                  <a:ext uri="{FF2B5EF4-FFF2-40B4-BE49-F238E27FC236}">
+                    <a16:creationId xmlns:a16="http://schemas.microsoft.com/office/drawing/2014/main" id="{0275BD6D-C504-4D2D-A5AA-D179973B6C89}"/>
+                  </a:ext>
+                </a:extLst>
+              </p:cNvPr>
+              <p:cNvSpPr/>
+              <p:nvPr/>
+            </p:nvSpPr>
+            <p:spPr>
+              <a:xfrm>
+                <a:off x="10745343" y="1375915"/>
+                <a:ext cx="878585" cy="365760"/>
+              </a:xfrm>
+              <a:prstGeom prst="rect">
+                <a:avLst/>
+              </a:prstGeom>
+              <a:grpFill/>
+              <a:ln>
+                <a:noFill/>
+              </a:ln>
+            </p:spPr>
+            <p:style>
+              <a:lnRef idx="2">
+                <a:schemeClr val="accent1">
+                  <a:shade val="50000"/>
+                </a:schemeClr>
+              </a:lnRef>
+              <a:fillRef idx="1">
+                <a:schemeClr val="accent1"/>
+              </a:fillRef>
+              <a:effectRef idx="0">
+                <a:schemeClr val="accent1"/>
+              </a:effectRef>
+              <a:fontRef idx="minor">
+                <a:schemeClr val="lt1"/>
+              </a:fontRef>
+            </p:style>
+            <p:txBody>
+              <a:bodyPr rtlCol="0" anchor="ctr"/>
+              <a:lstStyle/>
+              <a:p>
+                <a:pPr algn="ctr"/>
+                <a:endParaRPr lang="en-MY"/>
+              </a:p>
+            </p:txBody>
+          </p:sp>
+          <p:sp>
+            <p:nvSpPr>
+              <p:cNvPr id="72" name="Isosceles Triangle 71">
+                <a:extLst>
+                  <a:ext uri="{FF2B5EF4-FFF2-40B4-BE49-F238E27FC236}">
+                    <a16:creationId xmlns:a16="http://schemas.microsoft.com/office/drawing/2014/main" id="{EAB8E4B0-C7C8-42C0-A223-588878A86D3A}"/>
+                  </a:ext>
+                </a:extLst>
+              </p:cNvPr>
+              <p:cNvSpPr/>
+              <p:nvPr/>
+            </p:nvSpPr>
+            <p:spPr>
+              <a:xfrm>
+                <a:off x="10343007" y="1375915"/>
+                <a:ext cx="402336" cy="365760"/>
+              </a:xfrm>
+              <a:prstGeom prst="triangle">
+                <a:avLst>
+                  <a:gd name="adj" fmla="val 100000"/>
+                </a:avLst>
+              </a:prstGeom>
+              <a:grpFill/>
               <a:ln>
                 <a:noFill/>
               </a:ln>

</xml_diff>

<commit_message>
Added Authentication UI, for Log In and Sign Up
</commit_message>
<xml_diff>
--- a/Skeduler Wireframe.pptx
+++ b/Skeduler Wireframe.pptx
@@ -261,7 +261,7 @@
           <a:p>
             <a:fld id="{47616425-BEE7-450B-80FF-511C9063157C}" type="datetimeFigureOut">
               <a:rPr lang="en-MY" smtClean="0"/>
-              <a:t>18/3/2020</a:t>
+              <a:t>19/3/2020</a:t>
             </a:fld>
             <a:endParaRPr lang="en-MY"/>
           </a:p>
@@ -461,7 +461,7 @@
           <a:p>
             <a:fld id="{47616425-BEE7-450B-80FF-511C9063157C}" type="datetimeFigureOut">
               <a:rPr lang="en-MY" smtClean="0"/>
-              <a:t>18/3/2020</a:t>
+              <a:t>19/3/2020</a:t>
             </a:fld>
             <a:endParaRPr lang="en-MY"/>
           </a:p>
@@ -671,7 +671,7 @@
           <a:p>
             <a:fld id="{47616425-BEE7-450B-80FF-511C9063157C}" type="datetimeFigureOut">
               <a:rPr lang="en-MY" smtClean="0"/>
-              <a:t>18/3/2020</a:t>
+              <a:t>19/3/2020</a:t>
             </a:fld>
             <a:endParaRPr lang="en-MY"/>
           </a:p>
@@ -871,7 +871,7 @@
           <a:p>
             <a:fld id="{47616425-BEE7-450B-80FF-511C9063157C}" type="datetimeFigureOut">
               <a:rPr lang="en-MY" smtClean="0"/>
-              <a:t>18/3/2020</a:t>
+              <a:t>19/3/2020</a:t>
             </a:fld>
             <a:endParaRPr lang="en-MY"/>
           </a:p>
@@ -1147,7 +1147,7 @@
           <a:p>
             <a:fld id="{47616425-BEE7-450B-80FF-511C9063157C}" type="datetimeFigureOut">
               <a:rPr lang="en-MY" smtClean="0"/>
-              <a:t>18/3/2020</a:t>
+              <a:t>19/3/2020</a:t>
             </a:fld>
             <a:endParaRPr lang="en-MY"/>
           </a:p>
@@ -1415,7 +1415,7 @@
           <a:p>
             <a:fld id="{47616425-BEE7-450B-80FF-511C9063157C}" type="datetimeFigureOut">
               <a:rPr lang="en-MY" smtClean="0"/>
-              <a:t>18/3/2020</a:t>
+              <a:t>19/3/2020</a:t>
             </a:fld>
             <a:endParaRPr lang="en-MY"/>
           </a:p>
@@ -1830,7 +1830,7 @@
           <a:p>
             <a:fld id="{47616425-BEE7-450B-80FF-511C9063157C}" type="datetimeFigureOut">
               <a:rPr lang="en-MY" smtClean="0"/>
-              <a:t>18/3/2020</a:t>
+              <a:t>19/3/2020</a:t>
             </a:fld>
             <a:endParaRPr lang="en-MY"/>
           </a:p>
@@ -1972,7 +1972,7 @@
           <a:p>
             <a:fld id="{47616425-BEE7-450B-80FF-511C9063157C}" type="datetimeFigureOut">
               <a:rPr lang="en-MY" smtClean="0"/>
-              <a:t>18/3/2020</a:t>
+              <a:t>19/3/2020</a:t>
             </a:fld>
             <a:endParaRPr lang="en-MY"/>
           </a:p>
@@ -2085,7 +2085,7 @@
           <a:p>
             <a:fld id="{47616425-BEE7-450B-80FF-511C9063157C}" type="datetimeFigureOut">
               <a:rPr lang="en-MY" smtClean="0"/>
-              <a:t>18/3/2020</a:t>
+              <a:t>19/3/2020</a:t>
             </a:fld>
             <a:endParaRPr lang="en-MY"/>
           </a:p>
@@ -2398,7 +2398,7 @@
           <a:p>
             <a:fld id="{47616425-BEE7-450B-80FF-511C9063157C}" type="datetimeFigureOut">
               <a:rPr lang="en-MY" smtClean="0"/>
-              <a:t>18/3/2020</a:t>
+              <a:t>19/3/2020</a:t>
             </a:fld>
             <a:endParaRPr lang="en-MY"/>
           </a:p>
@@ -2687,7 +2687,7 @@
           <a:p>
             <a:fld id="{47616425-BEE7-450B-80FF-511C9063157C}" type="datetimeFigureOut">
               <a:rPr lang="en-MY" smtClean="0"/>
-              <a:t>18/3/2020</a:t>
+              <a:t>19/3/2020</a:t>
             </a:fld>
             <a:endParaRPr lang="en-MY"/>
           </a:p>
@@ -2935,7 +2935,7 @@
           <a:p>
             <a:fld id="{47616425-BEE7-450B-80FF-511C9063157C}" type="datetimeFigureOut">
               <a:rPr lang="en-MY" smtClean="0"/>
-              <a:t>18/3/2020</a:t>
+              <a:t>19/3/2020</a:t>
             </a:fld>
             <a:endParaRPr lang="en-MY"/>
           </a:p>
@@ -6173,10 +6173,10 @@
       </p:grpSp>
       <p:grpSp>
         <p:nvGrpSpPr>
-          <p:cNvPr id="84" name="Group 83">
+          <p:cNvPr id="66" name="Group 65">
             <a:extLst>
               <a:ext uri="{FF2B5EF4-FFF2-40B4-BE49-F238E27FC236}">
-                <a16:creationId xmlns:a16="http://schemas.microsoft.com/office/drawing/2014/main" id="{0FC02049-EE74-4B73-AA03-ED802C505B55}"/>
+                <a16:creationId xmlns:a16="http://schemas.microsoft.com/office/drawing/2014/main" id="{E9D19518-C4FA-423D-8972-2407B1D7CF4B}"/>
               </a:ext>
             </a:extLst>
           </p:cNvPr>
@@ -6185,18 +6185,73 @@
         </p:nvGrpSpPr>
         <p:grpSpPr>
           <a:xfrm>
-            <a:off x="9787508" y="502158"/>
-            <a:ext cx="1836421" cy="1828800"/>
-            <a:chOff x="9787508" y="502158"/>
-            <a:chExt cx="1836421" cy="1676396"/>
+            <a:off x="9144000" y="510426"/>
+            <a:ext cx="2286000" cy="2286000"/>
+            <a:chOff x="9144000" y="510426"/>
+            <a:chExt cx="2286000" cy="2286000"/>
           </a:xfrm>
         </p:grpSpPr>
+        <p:sp>
+          <p:nvSpPr>
+            <p:cNvPr id="58" name="Rectangle: Rounded Corners 57">
+              <a:extLst>
+                <a:ext uri="{FF2B5EF4-FFF2-40B4-BE49-F238E27FC236}">
+                  <a16:creationId xmlns:a16="http://schemas.microsoft.com/office/drawing/2014/main" id="{33F61AB7-FDFD-4F4A-AE1F-20B14EE1DCC1}"/>
+                </a:ext>
+              </a:extLst>
+            </p:cNvPr>
+            <p:cNvSpPr/>
+            <p:nvPr/>
+          </p:nvSpPr>
+          <p:spPr>
+            <a:xfrm>
+              <a:off x="9144000" y="510426"/>
+              <a:ext cx="2286000" cy="2286000"/>
+            </a:xfrm>
+            <a:prstGeom prst="roundRect">
+              <a:avLst/>
+            </a:prstGeom>
+            <a:solidFill>
+              <a:schemeClr val="tx1">
+                <a:lumMod val="75000"/>
+                <a:lumOff val="25000"/>
+              </a:schemeClr>
+            </a:solidFill>
+            <a:ln>
+              <a:noFill/>
+            </a:ln>
+          </p:spPr>
+          <p:style>
+            <a:lnRef idx="2">
+              <a:schemeClr val="accent1">
+                <a:shade val="50000"/>
+              </a:schemeClr>
+            </a:lnRef>
+            <a:fillRef idx="1">
+              <a:schemeClr val="accent1"/>
+            </a:fillRef>
+            <a:effectRef idx="0">
+              <a:schemeClr val="accent1"/>
+            </a:effectRef>
+            <a:fontRef idx="minor">
+              <a:schemeClr val="lt1"/>
+            </a:fontRef>
+          </p:style>
+          <p:txBody>
+            <a:bodyPr rtlCol="0" anchor="ctr"/>
+            <a:lstStyle/>
+            <a:p>
+              <a:pPr algn="ctr"/>
+              <a:endParaRPr lang="en-MY"/>
+            </a:p>
+          </p:txBody>
+        </p:sp>
         <p:grpSp>
           <p:nvGrpSpPr>
-            <p:cNvPr id="80" name="Group 79">
+            <p:cNvPr id="84" name="Group 83">
               <a:extLst>
                 <a:ext uri="{FF2B5EF4-FFF2-40B4-BE49-F238E27FC236}">
-                  <a16:creationId xmlns:a16="http://schemas.microsoft.com/office/drawing/2014/main" id="{F5EC1E60-1EF0-49AB-87ED-99D380D1A160}"/>
+                  <a16:creationId xmlns:a16="http://schemas.microsoft.com/office/drawing/2014/main" id="{0FC02049-EE74-4B73-AA03-ED802C505B55}"/>
                 </a:ext>
               </a:extLst>
             </p:cNvPr>
@@ -6205,124 +6260,598 @@
           </p:nvGrpSpPr>
           <p:grpSpPr>
             <a:xfrm>
-              <a:off x="9787509" y="502158"/>
-              <a:ext cx="1836419" cy="365760"/>
-              <a:chOff x="9787509" y="502158"/>
-              <a:chExt cx="1836419" cy="365760"/>
+              <a:off x="9509760" y="876186"/>
+              <a:ext cx="1554480" cy="1554480"/>
+              <a:chOff x="9787508" y="502158"/>
+              <a:chExt cx="1836421" cy="1676396"/>
             </a:xfrm>
-            <a:solidFill>
-              <a:srgbClr val="FF5050"/>
-            </a:solidFill>
           </p:grpSpPr>
-          <p:sp>
-            <p:nvSpPr>
-              <p:cNvPr id="64" name="Rectangle 63">
+          <p:grpSp>
+            <p:nvGrpSpPr>
+              <p:cNvPr id="80" name="Group 79">
                 <a:extLst>
                   <a:ext uri="{FF2B5EF4-FFF2-40B4-BE49-F238E27FC236}">
-                    <a16:creationId xmlns:a16="http://schemas.microsoft.com/office/drawing/2014/main" id="{0826B2D7-316C-44B9-B03D-461C08B38E65}"/>
+                    <a16:creationId xmlns:a16="http://schemas.microsoft.com/office/drawing/2014/main" id="{F5EC1E60-1EF0-49AB-87ED-99D380D1A160}"/>
                   </a:ext>
                 </a:extLst>
               </p:cNvPr>
-              <p:cNvSpPr/>
+              <p:cNvGrpSpPr/>
               <p:nvPr/>
-            </p:nvSpPr>
-            <p:spPr>
+            </p:nvGrpSpPr>
+            <p:grpSpPr>
               <a:xfrm>
-                <a:off x="10189845" y="502158"/>
-                <a:ext cx="1434083" cy="365760"/>
+                <a:off x="9787509" y="502158"/>
+                <a:ext cx="1836419" cy="365760"/>
+                <a:chOff x="9787509" y="502158"/>
+                <a:chExt cx="1836419" cy="365760"/>
               </a:xfrm>
-              <a:prstGeom prst="rect">
-                <a:avLst/>
-              </a:prstGeom>
-              <a:grpFill/>
-              <a:ln>
-                <a:noFill/>
-              </a:ln>
-            </p:spPr>
-            <p:style>
-              <a:lnRef idx="2">
-                <a:schemeClr val="accent1">
-                  <a:shade val="50000"/>
-                </a:schemeClr>
-              </a:lnRef>
-              <a:fillRef idx="1">
-                <a:schemeClr val="accent1"/>
-              </a:fillRef>
-              <a:effectRef idx="0">
-                <a:schemeClr val="accent1"/>
-              </a:effectRef>
-              <a:fontRef idx="minor">
-                <a:schemeClr val="lt1"/>
-              </a:fontRef>
-            </p:style>
-            <p:txBody>
-              <a:bodyPr rtlCol="0" anchor="ctr"/>
-              <a:lstStyle/>
-              <a:p>
-                <a:pPr algn="ctr"/>
-                <a:endParaRPr lang="en-MY"/>
-              </a:p>
-            </p:txBody>
-          </p:sp>
-          <p:sp>
-            <p:nvSpPr>
-              <p:cNvPr id="65" name="Isosceles Triangle 64">
+              <a:solidFill>
+                <a:srgbClr val="FF5050"/>
+              </a:solidFill>
+            </p:grpSpPr>
+            <p:sp>
+              <p:nvSpPr>
+                <p:cNvPr id="64" name="Rectangle 63">
+                  <a:extLst>
+                    <a:ext uri="{FF2B5EF4-FFF2-40B4-BE49-F238E27FC236}">
+                      <a16:creationId xmlns:a16="http://schemas.microsoft.com/office/drawing/2014/main" id="{0826B2D7-316C-44B9-B03D-461C08B38E65}"/>
+                    </a:ext>
+                  </a:extLst>
+                </p:cNvPr>
+                <p:cNvSpPr/>
+                <p:nvPr/>
+              </p:nvSpPr>
+              <p:spPr>
+                <a:xfrm>
+                  <a:off x="10189845" y="502158"/>
+                  <a:ext cx="1434083" cy="365760"/>
+                </a:xfrm>
+                <a:prstGeom prst="rect">
+                  <a:avLst/>
+                </a:prstGeom>
+                <a:grpFill/>
+                <a:ln>
+                  <a:noFill/>
+                </a:ln>
+              </p:spPr>
+              <p:style>
+                <a:lnRef idx="2">
+                  <a:schemeClr val="accent1">
+                    <a:shade val="50000"/>
+                  </a:schemeClr>
+                </a:lnRef>
+                <a:fillRef idx="1">
+                  <a:schemeClr val="accent1"/>
+                </a:fillRef>
+                <a:effectRef idx="0">
+                  <a:schemeClr val="accent1"/>
+                </a:effectRef>
+                <a:fontRef idx="minor">
+                  <a:schemeClr val="lt1"/>
+                </a:fontRef>
+              </p:style>
+              <p:txBody>
+                <a:bodyPr rtlCol="0" anchor="ctr"/>
+                <a:lstStyle/>
+                <a:p>
+                  <a:pPr algn="ctr"/>
+                  <a:endParaRPr lang="en-MY"/>
+                </a:p>
+              </p:txBody>
+            </p:sp>
+            <p:sp>
+              <p:nvSpPr>
+                <p:cNvPr id="65" name="Isosceles Triangle 64">
+                  <a:extLst>
+                    <a:ext uri="{FF2B5EF4-FFF2-40B4-BE49-F238E27FC236}">
+                      <a16:creationId xmlns:a16="http://schemas.microsoft.com/office/drawing/2014/main" id="{7C3B4C85-55C1-485B-A3C3-C8B69B92B1E0}"/>
+                    </a:ext>
+                  </a:extLst>
+                </p:cNvPr>
+                <p:cNvSpPr/>
+                <p:nvPr/>
+              </p:nvSpPr>
+              <p:spPr>
+                <a:xfrm>
+                  <a:off x="9787509" y="502158"/>
+                  <a:ext cx="402336" cy="365760"/>
+                </a:xfrm>
+                <a:prstGeom prst="triangle">
+                  <a:avLst>
+                    <a:gd name="adj" fmla="val 100000"/>
+                  </a:avLst>
+                </a:prstGeom>
+                <a:grpFill/>
+                <a:ln>
+                  <a:noFill/>
+                </a:ln>
+              </p:spPr>
+              <p:style>
+                <a:lnRef idx="2">
+                  <a:schemeClr val="accent1">
+                    <a:shade val="50000"/>
+                  </a:schemeClr>
+                </a:lnRef>
+                <a:fillRef idx="1">
+                  <a:schemeClr val="accent1"/>
+                </a:fillRef>
+                <a:effectRef idx="0">
+                  <a:schemeClr val="accent1"/>
+                </a:effectRef>
+                <a:fontRef idx="minor">
+                  <a:schemeClr val="lt1"/>
+                </a:fontRef>
+              </p:style>
+              <p:txBody>
+                <a:bodyPr rtlCol="0" anchor="ctr"/>
+                <a:lstStyle/>
+                <a:p>
+                  <a:pPr algn="ctr"/>
+                  <a:endParaRPr lang="en-MY"/>
+                </a:p>
+              </p:txBody>
+            </p:sp>
+          </p:grpSp>
+          <p:grpSp>
+            <p:nvGrpSpPr>
+              <p:cNvPr id="81" name="Group 80">
                 <a:extLst>
                   <a:ext uri="{FF2B5EF4-FFF2-40B4-BE49-F238E27FC236}">
-                    <a16:creationId xmlns:a16="http://schemas.microsoft.com/office/drawing/2014/main" id="{7C3B4C85-55C1-485B-A3C3-C8B69B92B1E0}"/>
+                    <a16:creationId xmlns:a16="http://schemas.microsoft.com/office/drawing/2014/main" id="{95049701-926A-4857-A63C-92F832138121}"/>
                   </a:ext>
                 </a:extLst>
               </p:cNvPr>
-              <p:cNvSpPr/>
+              <p:cNvGrpSpPr/>
               <p:nvPr/>
-            </p:nvSpPr>
-            <p:spPr>
+            </p:nvGrpSpPr>
+            <p:grpSpPr>
               <a:xfrm>
-                <a:off x="9787509" y="502158"/>
-                <a:ext cx="402336" cy="365760"/>
+                <a:off x="9787508" y="939037"/>
+                <a:ext cx="1280161" cy="365760"/>
+                <a:chOff x="9787508" y="939037"/>
+                <a:chExt cx="1280161" cy="365760"/>
               </a:xfrm>
-              <a:prstGeom prst="triangle">
-                <a:avLst>
-                  <a:gd name="adj" fmla="val 100000"/>
-                </a:avLst>
-              </a:prstGeom>
-              <a:grpFill/>
-              <a:ln>
-                <a:noFill/>
-              </a:ln>
-            </p:spPr>
-            <p:style>
-              <a:lnRef idx="2">
-                <a:schemeClr val="accent1">
-                  <a:shade val="50000"/>
-                </a:schemeClr>
-              </a:lnRef>
-              <a:fillRef idx="1">
-                <a:schemeClr val="accent1"/>
-              </a:fillRef>
-              <a:effectRef idx="0">
-                <a:schemeClr val="accent1"/>
-              </a:effectRef>
-              <a:fontRef idx="minor">
-                <a:schemeClr val="lt1"/>
-              </a:fontRef>
-            </p:style>
-            <p:txBody>
-              <a:bodyPr rtlCol="0" anchor="ctr"/>
-              <a:lstStyle/>
-              <a:p>
-                <a:pPr algn="ctr"/>
-                <a:endParaRPr lang="en-MY"/>
-              </a:p>
-            </p:txBody>
-          </p:sp>
+              <a:solidFill>
+                <a:srgbClr val="FFFF66"/>
+              </a:solidFill>
+            </p:grpSpPr>
+            <p:sp>
+              <p:nvSpPr>
+                <p:cNvPr id="68" name="Rectangle 67">
+                  <a:extLst>
+                    <a:ext uri="{FF2B5EF4-FFF2-40B4-BE49-F238E27FC236}">
+                      <a16:creationId xmlns:a16="http://schemas.microsoft.com/office/drawing/2014/main" id="{5E295388-206F-4E08-8668-4A1DF637D8C5}"/>
+                    </a:ext>
+                  </a:extLst>
+                </p:cNvPr>
+                <p:cNvSpPr/>
+                <p:nvPr/>
+              </p:nvSpPr>
+              <p:spPr>
+                <a:xfrm rot="10800000">
+                  <a:off x="9787508" y="939037"/>
+                  <a:ext cx="877824" cy="365760"/>
+                </a:xfrm>
+                <a:prstGeom prst="rect">
+                  <a:avLst/>
+                </a:prstGeom>
+                <a:grpFill/>
+                <a:ln>
+                  <a:noFill/>
+                </a:ln>
+              </p:spPr>
+              <p:style>
+                <a:lnRef idx="2">
+                  <a:schemeClr val="accent1">
+                    <a:shade val="50000"/>
+                  </a:schemeClr>
+                </a:lnRef>
+                <a:fillRef idx="1">
+                  <a:schemeClr val="accent1"/>
+                </a:fillRef>
+                <a:effectRef idx="0">
+                  <a:schemeClr val="accent1"/>
+                </a:effectRef>
+                <a:fontRef idx="minor">
+                  <a:schemeClr val="lt1"/>
+                </a:fontRef>
+              </p:style>
+              <p:txBody>
+                <a:bodyPr rtlCol="0" anchor="ctr"/>
+                <a:lstStyle/>
+                <a:p>
+                  <a:pPr algn="ctr"/>
+                  <a:endParaRPr lang="en-MY"/>
+                </a:p>
+              </p:txBody>
+            </p:sp>
+            <p:sp>
+              <p:nvSpPr>
+                <p:cNvPr id="69" name="Isosceles Triangle 68">
+                  <a:extLst>
+                    <a:ext uri="{FF2B5EF4-FFF2-40B4-BE49-F238E27FC236}">
+                      <a16:creationId xmlns:a16="http://schemas.microsoft.com/office/drawing/2014/main" id="{640450F5-A76B-4E2A-919E-1213E864D379}"/>
+                    </a:ext>
+                  </a:extLst>
+                </p:cNvPr>
+                <p:cNvSpPr/>
+                <p:nvPr/>
+              </p:nvSpPr>
+              <p:spPr>
+                <a:xfrm rot="10800000">
+                  <a:off x="10665333" y="939037"/>
+                  <a:ext cx="402336" cy="365760"/>
+                </a:xfrm>
+                <a:prstGeom prst="triangle">
+                  <a:avLst>
+                    <a:gd name="adj" fmla="val 100000"/>
+                  </a:avLst>
+                </a:prstGeom>
+                <a:grpFill/>
+                <a:ln>
+                  <a:noFill/>
+                </a:ln>
+              </p:spPr>
+              <p:style>
+                <a:lnRef idx="2">
+                  <a:schemeClr val="accent1">
+                    <a:shade val="50000"/>
+                  </a:schemeClr>
+                </a:lnRef>
+                <a:fillRef idx="1">
+                  <a:schemeClr val="accent1"/>
+                </a:fillRef>
+                <a:effectRef idx="0">
+                  <a:schemeClr val="accent1"/>
+                </a:effectRef>
+                <a:fontRef idx="minor">
+                  <a:schemeClr val="lt1"/>
+                </a:fontRef>
+              </p:style>
+              <p:txBody>
+                <a:bodyPr rtlCol="0" anchor="ctr"/>
+                <a:lstStyle/>
+                <a:p>
+                  <a:pPr algn="ctr"/>
+                  <a:endParaRPr lang="en-MY"/>
+                </a:p>
+              </p:txBody>
+            </p:sp>
+          </p:grpSp>
+          <p:grpSp>
+            <p:nvGrpSpPr>
+              <p:cNvPr id="83" name="Group 82">
+                <a:extLst>
+                  <a:ext uri="{FF2B5EF4-FFF2-40B4-BE49-F238E27FC236}">
+                    <a16:creationId xmlns:a16="http://schemas.microsoft.com/office/drawing/2014/main" id="{E7C28038-A65B-4D0C-AB01-6C6B0D25EB3E}"/>
+                  </a:ext>
+                </a:extLst>
+              </p:cNvPr>
+              <p:cNvGrpSpPr/>
+              <p:nvPr/>
+            </p:nvGrpSpPr>
+            <p:grpSpPr>
+              <a:xfrm>
+                <a:off x="9787508" y="1812794"/>
+                <a:ext cx="1836421" cy="365760"/>
+                <a:chOff x="9787508" y="1812794"/>
+                <a:chExt cx="1836421" cy="365760"/>
+              </a:xfrm>
+              <a:solidFill>
+                <a:srgbClr val="66CCFF"/>
+              </a:solidFill>
+            </p:grpSpPr>
+            <p:sp>
+              <p:nvSpPr>
+                <p:cNvPr id="74" name="Rectangle 73">
+                  <a:extLst>
+                    <a:ext uri="{FF2B5EF4-FFF2-40B4-BE49-F238E27FC236}">
+                      <a16:creationId xmlns:a16="http://schemas.microsoft.com/office/drawing/2014/main" id="{3CE06233-7306-4D25-BE51-6FC7881AC3C9}"/>
+                    </a:ext>
+                  </a:extLst>
+                </p:cNvPr>
+                <p:cNvSpPr/>
+                <p:nvPr/>
+              </p:nvSpPr>
+              <p:spPr>
+                <a:xfrm rot="10800000">
+                  <a:off x="9787508" y="1812794"/>
+                  <a:ext cx="1434084" cy="365760"/>
+                </a:xfrm>
+                <a:prstGeom prst="rect">
+                  <a:avLst/>
+                </a:prstGeom>
+                <a:grpFill/>
+                <a:ln>
+                  <a:noFill/>
+                </a:ln>
+              </p:spPr>
+              <p:style>
+                <a:lnRef idx="2">
+                  <a:schemeClr val="accent1">
+                    <a:shade val="50000"/>
+                  </a:schemeClr>
+                </a:lnRef>
+                <a:fillRef idx="1">
+                  <a:schemeClr val="accent1"/>
+                </a:fillRef>
+                <a:effectRef idx="0">
+                  <a:schemeClr val="accent1"/>
+                </a:effectRef>
+                <a:fontRef idx="minor">
+                  <a:schemeClr val="lt1"/>
+                </a:fontRef>
+              </p:style>
+              <p:txBody>
+                <a:bodyPr rtlCol="0" anchor="ctr"/>
+                <a:lstStyle/>
+                <a:p>
+                  <a:pPr algn="ctr"/>
+                  <a:endParaRPr lang="en-MY"/>
+                </a:p>
+              </p:txBody>
+            </p:sp>
+            <p:sp>
+              <p:nvSpPr>
+                <p:cNvPr id="75" name="Isosceles Triangle 74">
+                  <a:extLst>
+                    <a:ext uri="{FF2B5EF4-FFF2-40B4-BE49-F238E27FC236}">
+                      <a16:creationId xmlns:a16="http://schemas.microsoft.com/office/drawing/2014/main" id="{DA5C005A-0E58-465E-A186-255891CEA102}"/>
+                    </a:ext>
+                  </a:extLst>
+                </p:cNvPr>
+                <p:cNvSpPr/>
+                <p:nvPr/>
+              </p:nvSpPr>
+              <p:spPr>
+                <a:xfrm rot="10800000">
+                  <a:off x="11221593" y="1812794"/>
+                  <a:ext cx="402336" cy="365760"/>
+                </a:xfrm>
+                <a:prstGeom prst="triangle">
+                  <a:avLst>
+                    <a:gd name="adj" fmla="val 100000"/>
+                  </a:avLst>
+                </a:prstGeom>
+                <a:grpFill/>
+                <a:ln>
+                  <a:noFill/>
+                </a:ln>
+              </p:spPr>
+              <p:style>
+                <a:lnRef idx="2">
+                  <a:schemeClr val="accent1">
+                    <a:shade val="50000"/>
+                  </a:schemeClr>
+                </a:lnRef>
+                <a:fillRef idx="1">
+                  <a:schemeClr val="accent1"/>
+                </a:fillRef>
+                <a:effectRef idx="0">
+                  <a:schemeClr val="accent1"/>
+                </a:effectRef>
+                <a:fontRef idx="minor">
+                  <a:schemeClr val="lt1"/>
+                </a:fontRef>
+              </p:style>
+              <p:txBody>
+                <a:bodyPr rtlCol="0" anchor="ctr"/>
+                <a:lstStyle/>
+                <a:p>
+                  <a:pPr algn="ctr"/>
+                  <a:endParaRPr lang="en-MY"/>
+                </a:p>
+              </p:txBody>
+            </p:sp>
+          </p:grpSp>
+          <p:grpSp>
+            <p:nvGrpSpPr>
+              <p:cNvPr id="82" name="Group 81">
+                <a:extLst>
+                  <a:ext uri="{FF2B5EF4-FFF2-40B4-BE49-F238E27FC236}">
+                    <a16:creationId xmlns:a16="http://schemas.microsoft.com/office/drawing/2014/main" id="{6DC332B3-754D-4D96-BAEF-A1013837B838}"/>
+                  </a:ext>
+                </a:extLst>
+              </p:cNvPr>
+              <p:cNvGrpSpPr/>
+              <p:nvPr/>
+            </p:nvGrpSpPr>
+            <p:grpSpPr>
+              <a:xfrm>
+                <a:off x="10343007" y="1375915"/>
+                <a:ext cx="1280921" cy="365760"/>
+                <a:chOff x="10343007" y="1375915"/>
+                <a:chExt cx="1280921" cy="365760"/>
+              </a:xfrm>
+              <a:solidFill>
+                <a:srgbClr val="00FFCC"/>
+              </a:solidFill>
+            </p:grpSpPr>
+            <p:sp>
+              <p:nvSpPr>
+                <p:cNvPr id="71" name="Rectangle 70">
+                  <a:extLst>
+                    <a:ext uri="{FF2B5EF4-FFF2-40B4-BE49-F238E27FC236}">
+                      <a16:creationId xmlns:a16="http://schemas.microsoft.com/office/drawing/2014/main" id="{0275BD6D-C504-4D2D-A5AA-D179973B6C89}"/>
+                    </a:ext>
+                  </a:extLst>
+                </p:cNvPr>
+                <p:cNvSpPr/>
+                <p:nvPr/>
+              </p:nvSpPr>
+              <p:spPr>
+                <a:xfrm>
+                  <a:off x="10745343" y="1375915"/>
+                  <a:ext cx="878585" cy="365760"/>
+                </a:xfrm>
+                <a:prstGeom prst="rect">
+                  <a:avLst/>
+                </a:prstGeom>
+                <a:grpFill/>
+                <a:ln>
+                  <a:noFill/>
+                </a:ln>
+              </p:spPr>
+              <p:style>
+                <a:lnRef idx="2">
+                  <a:schemeClr val="accent1">
+                    <a:shade val="50000"/>
+                  </a:schemeClr>
+                </a:lnRef>
+                <a:fillRef idx="1">
+                  <a:schemeClr val="accent1"/>
+                </a:fillRef>
+                <a:effectRef idx="0">
+                  <a:schemeClr val="accent1"/>
+                </a:effectRef>
+                <a:fontRef idx="minor">
+                  <a:schemeClr val="lt1"/>
+                </a:fontRef>
+              </p:style>
+              <p:txBody>
+                <a:bodyPr rtlCol="0" anchor="ctr"/>
+                <a:lstStyle/>
+                <a:p>
+                  <a:pPr algn="ctr"/>
+                  <a:endParaRPr lang="en-MY"/>
+                </a:p>
+              </p:txBody>
+            </p:sp>
+            <p:sp>
+              <p:nvSpPr>
+                <p:cNvPr id="72" name="Isosceles Triangle 71">
+                  <a:extLst>
+                    <a:ext uri="{FF2B5EF4-FFF2-40B4-BE49-F238E27FC236}">
+                      <a16:creationId xmlns:a16="http://schemas.microsoft.com/office/drawing/2014/main" id="{EAB8E4B0-C7C8-42C0-A223-588878A86D3A}"/>
+                    </a:ext>
+                  </a:extLst>
+                </p:cNvPr>
+                <p:cNvSpPr/>
+                <p:nvPr/>
+              </p:nvSpPr>
+              <p:spPr>
+                <a:xfrm>
+                  <a:off x="10343007" y="1375915"/>
+                  <a:ext cx="402336" cy="365760"/>
+                </a:xfrm>
+                <a:prstGeom prst="triangle">
+                  <a:avLst>
+                    <a:gd name="adj" fmla="val 100000"/>
+                  </a:avLst>
+                </a:prstGeom>
+                <a:grpFill/>
+                <a:ln>
+                  <a:noFill/>
+                </a:ln>
+              </p:spPr>
+              <p:style>
+                <a:lnRef idx="2">
+                  <a:schemeClr val="accent1">
+                    <a:shade val="50000"/>
+                  </a:schemeClr>
+                </a:lnRef>
+                <a:fillRef idx="1">
+                  <a:schemeClr val="accent1"/>
+                </a:fillRef>
+                <a:effectRef idx="0">
+                  <a:schemeClr val="accent1"/>
+                </a:effectRef>
+                <a:fontRef idx="minor">
+                  <a:schemeClr val="lt1"/>
+                </a:fontRef>
+              </p:style>
+              <p:txBody>
+                <a:bodyPr rtlCol="0" anchor="ctr"/>
+                <a:lstStyle/>
+                <a:p>
+                  <a:pPr algn="ctr"/>
+                  <a:endParaRPr lang="en-MY"/>
+                </a:p>
+              </p:txBody>
+            </p:sp>
+          </p:grpSp>
         </p:grpSp>
+      </p:grpSp>
+      <p:grpSp>
+        <p:nvGrpSpPr>
+          <p:cNvPr id="73" name="Group 72">
+            <a:extLst>
+              <a:ext uri="{FF2B5EF4-FFF2-40B4-BE49-F238E27FC236}">
+                <a16:creationId xmlns:a16="http://schemas.microsoft.com/office/drawing/2014/main" id="{FFCDAD43-8BAF-4EC1-958D-B0B337C3B39D}"/>
+              </a:ext>
+            </a:extLst>
+          </p:cNvPr>
+          <p:cNvGrpSpPr/>
+          <p:nvPr/>
+        </p:nvGrpSpPr>
+        <p:grpSpPr>
+          <a:xfrm>
+            <a:off x="9144000" y="3138976"/>
+            <a:ext cx="2286000" cy="2286000"/>
+            <a:chOff x="9144000" y="3138976"/>
+            <a:chExt cx="2286000" cy="2286000"/>
+          </a:xfrm>
+        </p:grpSpPr>
+        <p:sp>
+          <p:nvSpPr>
+            <p:cNvPr id="79" name="Rectangle: Rounded Corners 78">
+              <a:extLst>
+                <a:ext uri="{FF2B5EF4-FFF2-40B4-BE49-F238E27FC236}">
+                  <a16:creationId xmlns:a16="http://schemas.microsoft.com/office/drawing/2014/main" id="{3144D5CC-18D8-4373-9A53-EB9703F02429}"/>
+                </a:ext>
+              </a:extLst>
+            </p:cNvPr>
+            <p:cNvSpPr/>
+            <p:nvPr/>
+          </p:nvSpPr>
+          <p:spPr>
+            <a:xfrm>
+              <a:off x="9144000" y="3138976"/>
+              <a:ext cx="2286000" cy="2286000"/>
+            </a:xfrm>
+            <a:prstGeom prst="roundRect">
+              <a:avLst>
+                <a:gd name="adj" fmla="val 7333"/>
+              </a:avLst>
+            </a:prstGeom>
+            <a:solidFill>
+              <a:schemeClr val="bg1"/>
+            </a:solidFill>
+            <a:ln>
+              <a:noFill/>
+            </a:ln>
+          </p:spPr>
+          <p:style>
+            <a:lnRef idx="2">
+              <a:schemeClr val="accent1">
+                <a:shade val="50000"/>
+              </a:schemeClr>
+            </a:lnRef>
+            <a:fillRef idx="1">
+              <a:schemeClr val="accent1"/>
+            </a:fillRef>
+            <a:effectRef idx="0">
+              <a:schemeClr val="accent1"/>
+            </a:effectRef>
+            <a:fontRef idx="minor">
+              <a:schemeClr val="lt1"/>
+            </a:fontRef>
+          </p:style>
+          <p:txBody>
+            <a:bodyPr rtlCol="0" anchor="ctr"/>
+            <a:lstStyle/>
+            <a:p>
+              <a:pPr algn="ctr"/>
+              <a:endParaRPr lang="en-MY"/>
+            </a:p>
+          </p:txBody>
+        </p:sp>
         <p:grpSp>
           <p:nvGrpSpPr>
-            <p:cNvPr id="81" name="Group 80">
+            <p:cNvPr id="85" name="Group 84">
               <a:extLst>
                 <a:ext uri="{FF2B5EF4-FFF2-40B4-BE49-F238E27FC236}">
-                  <a16:creationId xmlns:a16="http://schemas.microsoft.com/office/drawing/2014/main" id="{95049701-926A-4857-A63C-92F832138121}"/>
+                  <a16:creationId xmlns:a16="http://schemas.microsoft.com/office/drawing/2014/main" id="{FC0983A7-0B54-411B-86B3-FCBD53441DD7}"/>
                 </a:ext>
               </a:extLst>
             </p:cNvPr>
@@ -6331,369 +6860,525 @@
           </p:nvGrpSpPr>
           <p:grpSpPr>
             <a:xfrm>
-              <a:off x="9787508" y="939037"/>
-              <a:ext cx="1280161" cy="365760"/>
-              <a:chOff x="9787508" y="939037"/>
-              <a:chExt cx="1280161" cy="365760"/>
+              <a:off x="9509760" y="3504736"/>
+              <a:ext cx="1554480" cy="1554480"/>
+              <a:chOff x="9787508" y="502158"/>
+              <a:chExt cx="1836421" cy="1676396"/>
             </a:xfrm>
-            <a:solidFill>
-              <a:srgbClr val="FFFF66"/>
-            </a:solidFill>
+            <a:effectLst>
+              <a:outerShdw blurRad="63500" dist="38100" dir="3600000" sx="101000" sy="101000" algn="tl" rotWithShape="0">
+                <a:prstClr val="black">
+                  <a:alpha val="50000"/>
+                </a:prstClr>
+              </a:outerShdw>
+            </a:effectLst>
           </p:grpSpPr>
-          <p:sp>
-            <p:nvSpPr>
-              <p:cNvPr id="68" name="Rectangle 67">
+          <p:grpSp>
+            <p:nvGrpSpPr>
+              <p:cNvPr id="86" name="Group 85">
                 <a:extLst>
                   <a:ext uri="{FF2B5EF4-FFF2-40B4-BE49-F238E27FC236}">
-                    <a16:creationId xmlns:a16="http://schemas.microsoft.com/office/drawing/2014/main" id="{5E295388-206F-4E08-8668-4A1DF637D8C5}"/>
+                    <a16:creationId xmlns:a16="http://schemas.microsoft.com/office/drawing/2014/main" id="{98F73649-1600-4B55-8261-34A74F764842}"/>
                   </a:ext>
                 </a:extLst>
               </p:cNvPr>
-              <p:cNvSpPr/>
+              <p:cNvGrpSpPr/>
               <p:nvPr/>
-            </p:nvSpPr>
-            <p:spPr>
-              <a:xfrm rot="10800000">
-                <a:off x="9787508" y="939037"/>
-                <a:ext cx="877824" cy="365760"/>
+            </p:nvGrpSpPr>
+            <p:grpSpPr>
+              <a:xfrm>
+                <a:off x="9787509" y="502158"/>
+                <a:ext cx="1836419" cy="365760"/>
+                <a:chOff x="9787509" y="502158"/>
+                <a:chExt cx="1836419" cy="365760"/>
               </a:xfrm>
-              <a:prstGeom prst="rect">
-                <a:avLst/>
-              </a:prstGeom>
-              <a:grpFill/>
-              <a:ln>
-                <a:noFill/>
-              </a:ln>
-            </p:spPr>
-            <p:style>
-              <a:lnRef idx="2">
-                <a:schemeClr val="accent1">
-                  <a:shade val="50000"/>
-                </a:schemeClr>
-              </a:lnRef>
-              <a:fillRef idx="1">
-                <a:schemeClr val="accent1"/>
-              </a:fillRef>
-              <a:effectRef idx="0">
-                <a:schemeClr val="accent1"/>
-              </a:effectRef>
-              <a:fontRef idx="minor">
-                <a:schemeClr val="lt1"/>
-              </a:fontRef>
-            </p:style>
-            <p:txBody>
-              <a:bodyPr rtlCol="0" anchor="ctr"/>
-              <a:lstStyle/>
-              <a:p>
-                <a:pPr algn="ctr"/>
-                <a:endParaRPr lang="en-MY"/>
-              </a:p>
-            </p:txBody>
-          </p:sp>
-          <p:sp>
-            <p:nvSpPr>
-              <p:cNvPr id="69" name="Isosceles Triangle 68">
+              <a:solidFill>
+                <a:srgbClr val="FF5050"/>
+              </a:solidFill>
+            </p:grpSpPr>
+            <p:sp>
+              <p:nvSpPr>
+                <p:cNvPr id="96" name="Rectangle 95">
+                  <a:extLst>
+                    <a:ext uri="{FF2B5EF4-FFF2-40B4-BE49-F238E27FC236}">
+                      <a16:creationId xmlns:a16="http://schemas.microsoft.com/office/drawing/2014/main" id="{756AB10D-FEAF-447E-AE6F-06BAF348B31F}"/>
+                    </a:ext>
+                  </a:extLst>
+                </p:cNvPr>
+                <p:cNvSpPr/>
+                <p:nvPr/>
+              </p:nvSpPr>
+              <p:spPr>
+                <a:xfrm>
+                  <a:off x="10189845" y="502158"/>
+                  <a:ext cx="1434083" cy="365760"/>
+                </a:xfrm>
+                <a:prstGeom prst="rect">
+                  <a:avLst/>
+                </a:prstGeom>
+                <a:solidFill>
+                  <a:srgbClr val="FF5050"/>
+                </a:solidFill>
+                <a:ln>
+                  <a:noFill/>
+                </a:ln>
+              </p:spPr>
+              <p:style>
+                <a:lnRef idx="2">
+                  <a:schemeClr val="accent1">
+                    <a:shade val="50000"/>
+                  </a:schemeClr>
+                </a:lnRef>
+                <a:fillRef idx="1">
+                  <a:schemeClr val="accent1"/>
+                </a:fillRef>
+                <a:effectRef idx="0">
+                  <a:schemeClr val="accent1"/>
+                </a:effectRef>
+                <a:fontRef idx="minor">
+                  <a:schemeClr val="lt1"/>
+                </a:fontRef>
+              </p:style>
+              <p:txBody>
+                <a:bodyPr rtlCol="0" anchor="ctr"/>
+                <a:lstStyle/>
+                <a:p>
+                  <a:pPr algn="ctr"/>
+                  <a:endParaRPr lang="en-MY"/>
+                </a:p>
+              </p:txBody>
+            </p:sp>
+            <p:sp>
+              <p:nvSpPr>
+                <p:cNvPr id="97" name="Isosceles Triangle 96">
+                  <a:extLst>
+                    <a:ext uri="{FF2B5EF4-FFF2-40B4-BE49-F238E27FC236}">
+                      <a16:creationId xmlns:a16="http://schemas.microsoft.com/office/drawing/2014/main" id="{2CC391A4-46C4-46AF-918F-20163796DF96}"/>
+                    </a:ext>
+                  </a:extLst>
+                </p:cNvPr>
+                <p:cNvSpPr/>
+                <p:nvPr/>
+              </p:nvSpPr>
+              <p:spPr>
+                <a:xfrm>
+                  <a:off x="9787509" y="502158"/>
+                  <a:ext cx="402336" cy="365760"/>
+                </a:xfrm>
+                <a:prstGeom prst="triangle">
+                  <a:avLst>
+                    <a:gd name="adj" fmla="val 100000"/>
+                  </a:avLst>
+                </a:prstGeom>
+                <a:grpFill/>
+                <a:ln>
+                  <a:noFill/>
+                </a:ln>
+              </p:spPr>
+              <p:style>
+                <a:lnRef idx="2">
+                  <a:schemeClr val="accent1">
+                    <a:shade val="50000"/>
+                  </a:schemeClr>
+                </a:lnRef>
+                <a:fillRef idx="1">
+                  <a:schemeClr val="accent1"/>
+                </a:fillRef>
+                <a:effectRef idx="0">
+                  <a:schemeClr val="accent1"/>
+                </a:effectRef>
+                <a:fontRef idx="minor">
+                  <a:schemeClr val="lt1"/>
+                </a:fontRef>
+              </p:style>
+              <p:txBody>
+                <a:bodyPr rtlCol="0" anchor="ctr"/>
+                <a:lstStyle/>
+                <a:p>
+                  <a:pPr algn="ctr"/>
+                  <a:endParaRPr lang="en-MY"/>
+                </a:p>
+              </p:txBody>
+            </p:sp>
+          </p:grpSp>
+          <p:grpSp>
+            <p:nvGrpSpPr>
+              <p:cNvPr id="87" name="Group 86">
                 <a:extLst>
                   <a:ext uri="{FF2B5EF4-FFF2-40B4-BE49-F238E27FC236}">
-                    <a16:creationId xmlns:a16="http://schemas.microsoft.com/office/drawing/2014/main" id="{640450F5-A76B-4E2A-919E-1213E864D379}"/>
+                    <a16:creationId xmlns:a16="http://schemas.microsoft.com/office/drawing/2014/main" id="{D0BE8F1A-7C60-4613-9CBF-039AFC6451B2}"/>
                   </a:ext>
                 </a:extLst>
               </p:cNvPr>
-              <p:cNvSpPr/>
+              <p:cNvGrpSpPr/>
               <p:nvPr/>
-            </p:nvSpPr>
-            <p:spPr>
-              <a:xfrm rot="10800000">
-                <a:off x="10665333" y="939037"/>
-                <a:ext cx="402336" cy="365760"/>
+            </p:nvGrpSpPr>
+            <p:grpSpPr>
+              <a:xfrm>
+                <a:off x="9787508" y="939037"/>
+                <a:ext cx="1280161" cy="365760"/>
+                <a:chOff x="9787508" y="939037"/>
+                <a:chExt cx="1280161" cy="365760"/>
               </a:xfrm>
-              <a:prstGeom prst="triangle">
-                <a:avLst>
-                  <a:gd name="adj" fmla="val 100000"/>
-                </a:avLst>
-              </a:prstGeom>
-              <a:grpFill/>
-              <a:ln>
-                <a:noFill/>
-              </a:ln>
-            </p:spPr>
-            <p:style>
-              <a:lnRef idx="2">
-                <a:schemeClr val="accent1">
-                  <a:shade val="50000"/>
-                </a:schemeClr>
-              </a:lnRef>
-              <a:fillRef idx="1">
-                <a:schemeClr val="accent1"/>
-              </a:fillRef>
-              <a:effectRef idx="0">
-                <a:schemeClr val="accent1"/>
-              </a:effectRef>
-              <a:fontRef idx="minor">
-                <a:schemeClr val="lt1"/>
-              </a:fontRef>
-            </p:style>
-            <p:txBody>
-              <a:bodyPr rtlCol="0" anchor="ctr"/>
-              <a:lstStyle/>
-              <a:p>
-                <a:pPr algn="ctr"/>
-                <a:endParaRPr lang="en-MY"/>
-              </a:p>
-            </p:txBody>
-          </p:sp>
-        </p:grpSp>
-        <p:grpSp>
-          <p:nvGrpSpPr>
-            <p:cNvPr id="83" name="Group 82">
-              <a:extLst>
-                <a:ext uri="{FF2B5EF4-FFF2-40B4-BE49-F238E27FC236}">
-                  <a16:creationId xmlns:a16="http://schemas.microsoft.com/office/drawing/2014/main" id="{E7C28038-A65B-4D0C-AB01-6C6B0D25EB3E}"/>
-                </a:ext>
-              </a:extLst>
-            </p:cNvPr>
-            <p:cNvGrpSpPr/>
-            <p:nvPr/>
-          </p:nvGrpSpPr>
-          <p:grpSpPr>
-            <a:xfrm>
-              <a:off x="9787508" y="1812794"/>
-              <a:ext cx="1836421" cy="365760"/>
-              <a:chOff x="9787508" y="1812794"/>
-              <a:chExt cx="1836421" cy="365760"/>
-            </a:xfrm>
-            <a:solidFill>
-              <a:srgbClr val="66CCFF"/>
-            </a:solidFill>
-          </p:grpSpPr>
-          <p:sp>
-            <p:nvSpPr>
-              <p:cNvPr id="74" name="Rectangle 73">
+              <a:solidFill>
+                <a:srgbClr val="FFFF66"/>
+              </a:solidFill>
+            </p:grpSpPr>
+            <p:sp>
+              <p:nvSpPr>
+                <p:cNvPr id="94" name="Rectangle 93">
+                  <a:extLst>
+                    <a:ext uri="{FF2B5EF4-FFF2-40B4-BE49-F238E27FC236}">
+                      <a16:creationId xmlns:a16="http://schemas.microsoft.com/office/drawing/2014/main" id="{50DCB1A2-02AE-457D-A106-D90FC8E7044D}"/>
+                    </a:ext>
+                  </a:extLst>
+                </p:cNvPr>
+                <p:cNvSpPr/>
+                <p:nvPr/>
+              </p:nvSpPr>
+              <p:spPr>
+                <a:xfrm rot="10800000">
+                  <a:off x="9787508" y="939037"/>
+                  <a:ext cx="877824" cy="365760"/>
+                </a:xfrm>
+                <a:prstGeom prst="rect">
+                  <a:avLst/>
+                </a:prstGeom>
+                <a:grpFill/>
+                <a:ln>
+                  <a:noFill/>
+                </a:ln>
+              </p:spPr>
+              <p:style>
+                <a:lnRef idx="2">
+                  <a:schemeClr val="accent1">
+                    <a:shade val="50000"/>
+                  </a:schemeClr>
+                </a:lnRef>
+                <a:fillRef idx="1">
+                  <a:schemeClr val="accent1"/>
+                </a:fillRef>
+                <a:effectRef idx="0">
+                  <a:schemeClr val="accent1"/>
+                </a:effectRef>
+                <a:fontRef idx="minor">
+                  <a:schemeClr val="lt1"/>
+                </a:fontRef>
+              </p:style>
+              <p:txBody>
+                <a:bodyPr rtlCol="0" anchor="ctr"/>
+                <a:lstStyle/>
+                <a:p>
+                  <a:pPr algn="ctr"/>
+                  <a:endParaRPr lang="en-MY"/>
+                </a:p>
+              </p:txBody>
+            </p:sp>
+            <p:sp>
+              <p:nvSpPr>
+                <p:cNvPr id="95" name="Isosceles Triangle 94">
+                  <a:extLst>
+                    <a:ext uri="{FF2B5EF4-FFF2-40B4-BE49-F238E27FC236}">
+                      <a16:creationId xmlns:a16="http://schemas.microsoft.com/office/drawing/2014/main" id="{6947BBA7-BC6E-400C-80C9-0D1B64CD3459}"/>
+                    </a:ext>
+                  </a:extLst>
+                </p:cNvPr>
+                <p:cNvSpPr/>
+                <p:nvPr/>
+              </p:nvSpPr>
+              <p:spPr>
+                <a:xfrm rot="10800000">
+                  <a:off x="10665333" y="939037"/>
+                  <a:ext cx="402336" cy="365760"/>
+                </a:xfrm>
+                <a:prstGeom prst="triangle">
+                  <a:avLst>
+                    <a:gd name="adj" fmla="val 100000"/>
+                  </a:avLst>
+                </a:prstGeom>
+                <a:grpFill/>
+                <a:ln>
+                  <a:noFill/>
+                </a:ln>
+              </p:spPr>
+              <p:style>
+                <a:lnRef idx="2">
+                  <a:schemeClr val="accent1">
+                    <a:shade val="50000"/>
+                  </a:schemeClr>
+                </a:lnRef>
+                <a:fillRef idx="1">
+                  <a:schemeClr val="accent1"/>
+                </a:fillRef>
+                <a:effectRef idx="0">
+                  <a:schemeClr val="accent1"/>
+                </a:effectRef>
+                <a:fontRef idx="minor">
+                  <a:schemeClr val="lt1"/>
+                </a:fontRef>
+              </p:style>
+              <p:txBody>
+                <a:bodyPr rtlCol="0" anchor="ctr"/>
+                <a:lstStyle/>
+                <a:p>
+                  <a:pPr algn="ctr"/>
+                  <a:endParaRPr lang="en-MY"/>
+                </a:p>
+              </p:txBody>
+            </p:sp>
+          </p:grpSp>
+          <p:grpSp>
+            <p:nvGrpSpPr>
+              <p:cNvPr id="88" name="Group 87">
                 <a:extLst>
                   <a:ext uri="{FF2B5EF4-FFF2-40B4-BE49-F238E27FC236}">
-                    <a16:creationId xmlns:a16="http://schemas.microsoft.com/office/drawing/2014/main" id="{3CE06233-7306-4D25-BE51-6FC7881AC3C9}"/>
+                    <a16:creationId xmlns:a16="http://schemas.microsoft.com/office/drawing/2014/main" id="{314820B0-AA3C-4DCA-96BC-DCD7815AF842}"/>
                   </a:ext>
                 </a:extLst>
               </p:cNvPr>
-              <p:cNvSpPr/>
+              <p:cNvGrpSpPr/>
               <p:nvPr/>
-            </p:nvSpPr>
-            <p:spPr>
-              <a:xfrm rot="10800000">
+            </p:nvGrpSpPr>
+            <p:grpSpPr>
+              <a:xfrm>
                 <a:off x="9787508" y="1812794"/>
-                <a:ext cx="1434084" cy="365760"/>
+                <a:ext cx="1836421" cy="365760"/>
+                <a:chOff x="9787508" y="1812794"/>
+                <a:chExt cx="1836421" cy="365760"/>
               </a:xfrm>
-              <a:prstGeom prst="rect">
-                <a:avLst/>
-              </a:prstGeom>
-              <a:grpFill/>
-              <a:ln>
-                <a:noFill/>
-              </a:ln>
-            </p:spPr>
-            <p:style>
-              <a:lnRef idx="2">
-                <a:schemeClr val="accent1">
-                  <a:shade val="50000"/>
-                </a:schemeClr>
-              </a:lnRef>
-              <a:fillRef idx="1">
-                <a:schemeClr val="accent1"/>
-              </a:fillRef>
-              <a:effectRef idx="0">
-                <a:schemeClr val="accent1"/>
-              </a:effectRef>
-              <a:fontRef idx="minor">
-                <a:schemeClr val="lt1"/>
-              </a:fontRef>
-            </p:style>
-            <p:txBody>
-              <a:bodyPr rtlCol="0" anchor="ctr"/>
-              <a:lstStyle/>
-              <a:p>
-                <a:pPr algn="ctr"/>
-                <a:endParaRPr lang="en-MY"/>
-              </a:p>
-            </p:txBody>
-          </p:sp>
-          <p:sp>
-            <p:nvSpPr>
-              <p:cNvPr id="75" name="Isosceles Triangle 74">
+              <a:solidFill>
+                <a:srgbClr val="66CCFF"/>
+              </a:solidFill>
+            </p:grpSpPr>
+            <p:sp>
+              <p:nvSpPr>
+                <p:cNvPr id="92" name="Rectangle 91">
+                  <a:extLst>
+                    <a:ext uri="{FF2B5EF4-FFF2-40B4-BE49-F238E27FC236}">
+                      <a16:creationId xmlns:a16="http://schemas.microsoft.com/office/drawing/2014/main" id="{FDC84693-5B60-422B-ABBC-F7AEE66B2249}"/>
+                    </a:ext>
+                  </a:extLst>
+                </p:cNvPr>
+                <p:cNvSpPr/>
+                <p:nvPr/>
+              </p:nvSpPr>
+              <p:spPr>
+                <a:xfrm rot="10800000">
+                  <a:off x="9787508" y="1812794"/>
+                  <a:ext cx="1434084" cy="365760"/>
+                </a:xfrm>
+                <a:prstGeom prst="rect">
+                  <a:avLst/>
+                </a:prstGeom>
+                <a:grpFill/>
+                <a:ln>
+                  <a:noFill/>
+                </a:ln>
+              </p:spPr>
+              <p:style>
+                <a:lnRef idx="2">
+                  <a:schemeClr val="accent1">
+                    <a:shade val="50000"/>
+                  </a:schemeClr>
+                </a:lnRef>
+                <a:fillRef idx="1">
+                  <a:schemeClr val="accent1"/>
+                </a:fillRef>
+                <a:effectRef idx="0">
+                  <a:schemeClr val="accent1"/>
+                </a:effectRef>
+                <a:fontRef idx="minor">
+                  <a:schemeClr val="lt1"/>
+                </a:fontRef>
+              </p:style>
+              <p:txBody>
+                <a:bodyPr rtlCol="0" anchor="ctr"/>
+                <a:lstStyle/>
+                <a:p>
+                  <a:pPr algn="ctr"/>
+                  <a:endParaRPr lang="en-MY"/>
+                </a:p>
+              </p:txBody>
+            </p:sp>
+            <p:sp>
+              <p:nvSpPr>
+                <p:cNvPr id="93" name="Isosceles Triangle 92">
+                  <a:extLst>
+                    <a:ext uri="{FF2B5EF4-FFF2-40B4-BE49-F238E27FC236}">
+                      <a16:creationId xmlns:a16="http://schemas.microsoft.com/office/drawing/2014/main" id="{D47E4F0F-58E0-4BB2-BD23-922D696373A0}"/>
+                    </a:ext>
+                  </a:extLst>
+                </p:cNvPr>
+                <p:cNvSpPr/>
+                <p:nvPr/>
+              </p:nvSpPr>
+              <p:spPr>
+                <a:xfrm rot="10800000">
+                  <a:off x="11221593" y="1812794"/>
+                  <a:ext cx="402336" cy="365760"/>
+                </a:xfrm>
+                <a:prstGeom prst="triangle">
+                  <a:avLst>
+                    <a:gd name="adj" fmla="val 100000"/>
+                  </a:avLst>
+                </a:prstGeom>
+                <a:grpFill/>
+                <a:ln>
+                  <a:noFill/>
+                </a:ln>
+              </p:spPr>
+              <p:style>
+                <a:lnRef idx="2">
+                  <a:schemeClr val="accent1">
+                    <a:shade val="50000"/>
+                  </a:schemeClr>
+                </a:lnRef>
+                <a:fillRef idx="1">
+                  <a:schemeClr val="accent1"/>
+                </a:fillRef>
+                <a:effectRef idx="0">
+                  <a:schemeClr val="accent1"/>
+                </a:effectRef>
+                <a:fontRef idx="minor">
+                  <a:schemeClr val="lt1"/>
+                </a:fontRef>
+              </p:style>
+              <p:txBody>
+                <a:bodyPr rtlCol="0" anchor="ctr"/>
+                <a:lstStyle/>
+                <a:p>
+                  <a:pPr algn="ctr"/>
+                  <a:endParaRPr lang="en-MY"/>
+                </a:p>
+              </p:txBody>
+            </p:sp>
+          </p:grpSp>
+          <p:grpSp>
+            <p:nvGrpSpPr>
+              <p:cNvPr id="89" name="Group 88">
                 <a:extLst>
                   <a:ext uri="{FF2B5EF4-FFF2-40B4-BE49-F238E27FC236}">
-                    <a16:creationId xmlns:a16="http://schemas.microsoft.com/office/drawing/2014/main" id="{DA5C005A-0E58-465E-A186-255891CEA102}"/>
+                    <a16:creationId xmlns:a16="http://schemas.microsoft.com/office/drawing/2014/main" id="{4765527B-91CA-4807-ADAD-9E0B48D76264}"/>
                   </a:ext>
                 </a:extLst>
               </p:cNvPr>
-              <p:cNvSpPr/>
+              <p:cNvGrpSpPr/>
               <p:nvPr/>
-            </p:nvSpPr>
-            <p:spPr>
-              <a:xfrm rot="10800000">
-                <a:off x="11221593" y="1812794"/>
-                <a:ext cx="402336" cy="365760"/>
-              </a:xfrm>
-              <a:prstGeom prst="triangle">
-                <a:avLst>
-                  <a:gd name="adj" fmla="val 100000"/>
-                </a:avLst>
-              </a:prstGeom>
-              <a:grpFill/>
-              <a:ln>
-                <a:noFill/>
-              </a:ln>
-            </p:spPr>
-            <p:style>
-              <a:lnRef idx="2">
-                <a:schemeClr val="accent1">
-                  <a:shade val="50000"/>
-                </a:schemeClr>
-              </a:lnRef>
-              <a:fillRef idx="1">
-                <a:schemeClr val="accent1"/>
-              </a:fillRef>
-              <a:effectRef idx="0">
-                <a:schemeClr val="accent1"/>
-              </a:effectRef>
-              <a:fontRef idx="minor">
-                <a:schemeClr val="lt1"/>
-              </a:fontRef>
-            </p:style>
-            <p:txBody>
-              <a:bodyPr rtlCol="0" anchor="ctr"/>
-              <a:lstStyle/>
-              <a:p>
-                <a:pPr algn="ctr"/>
-                <a:endParaRPr lang="en-MY"/>
-              </a:p>
-            </p:txBody>
-          </p:sp>
-        </p:grpSp>
-        <p:grpSp>
-          <p:nvGrpSpPr>
-            <p:cNvPr id="82" name="Group 81">
-              <a:extLst>
-                <a:ext uri="{FF2B5EF4-FFF2-40B4-BE49-F238E27FC236}">
-                  <a16:creationId xmlns:a16="http://schemas.microsoft.com/office/drawing/2014/main" id="{6DC332B3-754D-4D96-BAEF-A1013837B838}"/>
-                </a:ext>
-              </a:extLst>
-            </p:cNvPr>
-            <p:cNvGrpSpPr/>
-            <p:nvPr/>
-          </p:nvGrpSpPr>
-          <p:grpSpPr>
-            <a:xfrm>
-              <a:off x="10343007" y="1375915"/>
-              <a:ext cx="1280921" cy="365760"/>
-              <a:chOff x="10343007" y="1375915"/>
-              <a:chExt cx="1280921" cy="365760"/>
-            </a:xfrm>
-            <a:solidFill>
-              <a:srgbClr val="00FFCC"/>
-            </a:solidFill>
-          </p:grpSpPr>
-          <p:sp>
-            <p:nvSpPr>
-              <p:cNvPr id="71" name="Rectangle 70">
-                <a:extLst>
-                  <a:ext uri="{FF2B5EF4-FFF2-40B4-BE49-F238E27FC236}">
-                    <a16:creationId xmlns:a16="http://schemas.microsoft.com/office/drawing/2014/main" id="{0275BD6D-C504-4D2D-A5AA-D179973B6C89}"/>
-                  </a:ext>
-                </a:extLst>
-              </p:cNvPr>
-              <p:cNvSpPr/>
-              <p:nvPr/>
-            </p:nvSpPr>
-            <p:spPr>
-              <a:xfrm>
-                <a:off x="10745343" y="1375915"/>
-                <a:ext cx="878585" cy="365760"/>
-              </a:xfrm>
-              <a:prstGeom prst="rect">
-                <a:avLst/>
-              </a:prstGeom>
-              <a:grpFill/>
-              <a:ln>
-                <a:noFill/>
-              </a:ln>
-            </p:spPr>
-            <p:style>
-              <a:lnRef idx="2">
-                <a:schemeClr val="accent1">
-                  <a:shade val="50000"/>
-                </a:schemeClr>
-              </a:lnRef>
-              <a:fillRef idx="1">
-                <a:schemeClr val="accent1"/>
-              </a:fillRef>
-              <a:effectRef idx="0">
-                <a:schemeClr val="accent1"/>
-              </a:effectRef>
-              <a:fontRef idx="minor">
-                <a:schemeClr val="lt1"/>
-              </a:fontRef>
-            </p:style>
-            <p:txBody>
-              <a:bodyPr rtlCol="0" anchor="ctr"/>
-              <a:lstStyle/>
-              <a:p>
-                <a:pPr algn="ctr"/>
-                <a:endParaRPr lang="en-MY"/>
-              </a:p>
-            </p:txBody>
-          </p:sp>
-          <p:sp>
-            <p:nvSpPr>
-              <p:cNvPr id="72" name="Isosceles Triangle 71">
-                <a:extLst>
-                  <a:ext uri="{FF2B5EF4-FFF2-40B4-BE49-F238E27FC236}">
-                    <a16:creationId xmlns:a16="http://schemas.microsoft.com/office/drawing/2014/main" id="{EAB8E4B0-C7C8-42C0-A223-588878A86D3A}"/>
-                  </a:ext>
-                </a:extLst>
-              </p:cNvPr>
-              <p:cNvSpPr/>
-              <p:nvPr/>
-            </p:nvSpPr>
-            <p:spPr>
+            </p:nvGrpSpPr>
+            <p:grpSpPr>
               <a:xfrm>
                 <a:off x="10343007" y="1375915"/>
-                <a:ext cx="402336" cy="365760"/>
+                <a:ext cx="1280921" cy="365760"/>
+                <a:chOff x="10343007" y="1375915"/>
+                <a:chExt cx="1280921" cy="365760"/>
               </a:xfrm>
-              <a:prstGeom prst="triangle">
-                <a:avLst>
-                  <a:gd name="adj" fmla="val 100000"/>
-                </a:avLst>
-              </a:prstGeom>
-              <a:grpFill/>
-              <a:ln>
-                <a:noFill/>
-              </a:ln>
-            </p:spPr>
-            <p:style>
-              <a:lnRef idx="2">
-                <a:schemeClr val="accent1">
-                  <a:shade val="50000"/>
-                </a:schemeClr>
-              </a:lnRef>
-              <a:fillRef idx="1">
-                <a:schemeClr val="accent1"/>
-              </a:fillRef>
-              <a:effectRef idx="0">
-                <a:schemeClr val="accent1"/>
-              </a:effectRef>
-              <a:fontRef idx="minor">
-                <a:schemeClr val="lt1"/>
-              </a:fontRef>
-            </p:style>
-            <p:txBody>
-              <a:bodyPr rtlCol="0" anchor="ctr"/>
-              <a:lstStyle/>
-              <a:p>
-                <a:pPr algn="ctr"/>
-                <a:endParaRPr lang="en-MY"/>
-              </a:p>
-            </p:txBody>
-          </p:sp>
+              <a:solidFill>
+                <a:srgbClr val="00FFCC"/>
+              </a:solidFill>
+            </p:grpSpPr>
+            <p:sp>
+              <p:nvSpPr>
+                <p:cNvPr id="90" name="Rectangle 89">
+                  <a:extLst>
+                    <a:ext uri="{FF2B5EF4-FFF2-40B4-BE49-F238E27FC236}">
+                      <a16:creationId xmlns:a16="http://schemas.microsoft.com/office/drawing/2014/main" id="{DF85975B-E954-4DE1-BD20-F733721E713A}"/>
+                    </a:ext>
+                  </a:extLst>
+                </p:cNvPr>
+                <p:cNvSpPr/>
+                <p:nvPr/>
+              </p:nvSpPr>
+              <p:spPr>
+                <a:xfrm>
+                  <a:off x="10745343" y="1375915"/>
+                  <a:ext cx="878585" cy="365760"/>
+                </a:xfrm>
+                <a:prstGeom prst="rect">
+                  <a:avLst/>
+                </a:prstGeom>
+                <a:grpFill/>
+                <a:ln>
+                  <a:noFill/>
+                </a:ln>
+              </p:spPr>
+              <p:style>
+                <a:lnRef idx="2">
+                  <a:schemeClr val="accent1">
+                    <a:shade val="50000"/>
+                  </a:schemeClr>
+                </a:lnRef>
+                <a:fillRef idx="1">
+                  <a:schemeClr val="accent1"/>
+                </a:fillRef>
+                <a:effectRef idx="0">
+                  <a:schemeClr val="accent1"/>
+                </a:effectRef>
+                <a:fontRef idx="minor">
+                  <a:schemeClr val="lt1"/>
+                </a:fontRef>
+              </p:style>
+              <p:txBody>
+                <a:bodyPr rtlCol="0" anchor="ctr"/>
+                <a:lstStyle/>
+                <a:p>
+                  <a:pPr algn="ctr"/>
+                  <a:endParaRPr lang="en-MY"/>
+                </a:p>
+              </p:txBody>
+            </p:sp>
+            <p:sp>
+              <p:nvSpPr>
+                <p:cNvPr id="91" name="Isosceles Triangle 90">
+                  <a:extLst>
+                    <a:ext uri="{FF2B5EF4-FFF2-40B4-BE49-F238E27FC236}">
+                      <a16:creationId xmlns:a16="http://schemas.microsoft.com/office/drawing/2014/main" id="{09ADB5AE-8B61-4017-8846-71D71500F4C7}"/>
+                    </a:ext>
+                  </a:extLst>
+                </p:cNvPr>
+                <p:cNvSpPr/>
+                <p:nvPr/>
+              </p:nvSpPr>
+              <p:spPr>
+                <a:xfrm>
+                  <a:off x="10343007" y="1375915"/>
+                  <a:ext cx="402336" cy="365760"/>
+                </a:xfrm>
+                <a:prstGeom prst="triangle">
+                  <a:avLst>
+                    <a:gd name="adj" fmla="val 100000"/>
+                  </a:avLst>
+                </a:prstGeom>
+                <a:grpFill/>
+                <a:ln>
+                  <a:noFill/>
+                </a:ln>
+              </p:spPr>
+              <p:style>
+                <a:lnRef idx="2">
+                  <a:schemeClr val="accent1">
+                    <a:shade val="50000"/>
+                  </a:schemeClr>
+                </a:lnRef>
+                <a:fillRef idx="1">
+                  <a:schemeClr val="accent1"/>
+                </a:fillRef>
+                <a:effectRef idx="0">
+                  <a:schemeClr val="accent1"/>
+                </a:effectRef>
+                <a:fontRef idx="minor">
+                  <a:schemeClr val="lt1"/>
+                </a:fontRef>
+              </p:style>
+              <p:txBody>
+                <a:bodyPr rtlCol="0" anchor="ctr"/>
+                <a:lstStyle/>
+                <a:p>
+                  <a:pPr algn="ctr"/>
+                  <a:endParaRPr lang="en-MY"/>
+                </a:p>
+              </p:txBody>
+            </p:sp>
+          </p:grpSp>
         </p:grpSp>
       </p:grpSp>
     </p:spTree>

</xml_diff>

<commit_message>
Fixed some bugs: Member has alwaysAvailable, timesAvailable, timesUnavailable on create (owner), removed validate for description formKey
</commit_message>
<xml_diff>
--- a/Skeduler Wireframe.pptx
+++ b/Skeduler Wireframe.pptx
@@ -261,7 +261,7 @@
           <a:p>
             <a:fld id="{47616425-BEE7-450B-80FF-511C9063157C}" type="datetimeFigureOut">
               <a:rPr lang="en-MY" smtClean="0"/>
-              <a:t>21/3/2020</a:t>
+              <a:t>11/9/2020</a:t>
             </a:fld>
             <a:endParaRPr lang="en-MY"/>
           </a:p>
@@ -461,7 +461,7 @@
           <a:p>
             <a:fld id="{47616425-BEE7-450B-80FF-511C9063157C}" type="datetimeFigureOut">
               <a:rPr lang="en-MY" smtClean="0"/>
-              <a:t>21/3/2020</a:t>
+              <a:t>11/9/2020</a:t>
             </a:fld>
             <a:endParaRPr lang="en-MY"/>
           </a:p>
@@ -671,7 +671,7 @@
           <a:p>
             <a:fld id="{47616425-BEE7-450B-80FF-511C9063157C}" type="datetimeFigureOut">
               <a:rPr lang="en-MY" smtClean="0"/>
-              <a:t>21/3/2020</a:t>
+              <a:t>11/9/2020</a:t>
             </a:fld>
             <a:endParaRPr lang="en-MY"/>
           </a:p>
@@ -871,7 +871,7 @@
           <a:p>
             <a:fld id="{47616425-BEE7-450B-80FF-511C9063157C}" type="datetimeFigureOut">
               <a:rPr lang="en-MY" smtClean="0"/>
-              <a:t>21/3/2020</a:t>
+              <a:t>11/9/2020</a:t>
             </a:fld>
             <a:endParaRPr lang="en-MY"/>
           </a:p>
@@ -1147,7 +1147,7 @@
           <a:p>
             <a:fld id="{47616425-BEE7-450B-80FF-511C9063157C}" type="datetimeFigureOut">
               <a:rPr lang="en-MY" smtClean="0"/>
-              <a:t>21/3/2020</a:t>
+              <a:t>11/9/2020</a:t>
             </a:fld>
             <a:endParaRPr lang="en-MY"/>
           </a:p>
@@ -1415,7 +1415,7 @@
           <a:p>
             <a:fld id="{47616425-BEE7-450B-80FF-511C9063157C}" type="datetimeFigureOut">
               <a:rPr lang="en-MY" smtClean="0"/>
-              <a:t>21/3/2020</a:t>
+              <a:t>11/9/2020</a:t>
             </a:fld>
             <a:endParaRPr lang="en-MY"/>
           </a:p>
@@ -1830,7 +1830,7 @@
           <a:p>
             <a:fld id="{47616425-BEE7-450B-80FF-511C9063157C}" type="datetimeFigureOut">
               <a:rPr lang="en-MY" smtClean="0"/>
-              <a:t>21/3/2020</a:t>
+              <a:t>11/9/2020</a:t>
             </a:fld>
             <a:endParaRPr lang="en-MY"/>
           </a:p>
@@ -1972,7 +1972,7 @@
           <a:p>
             <a:fld id="{47616425-BEE7-450B-80FF-511C9063157C}" type="datetimeFigureOut">
               <a:rPr lang="en-MY" smtClean="0"/>
-              <a:t>21/3/2020</a:t>
+              <a:t>11/9/2020</a:t>
             </a:fld>
             <a:endParaRPr lang="en-MY"/>
           </a:p>
@@ -2085,7 +2085,7 @@
           <a:p>
             <a:fld id="{47616425-BEE7-450B-80FF-511C9063157C}" type="datetimeFigureOut">
               <a:rPr lang="en-MY" smtClean="0"/>
-              <a:t>21/3/2020</a:t>
+              <a:t>11/9/2020</a:t>
             </a:fld>
             <a:endParaRPr lang="en-MY"/>
           </a:p>
@@ -2398,7 +2398,7 @@
           <a:p>
             <a:fld id="{47616425-BEE7-450B-80FF-511C9063157C}" type="datetimeFigureOut">
               <a:rPr lang="en-MY" smtClean="0"/>
-              <a:t>21/3/2020</a:t>
+              <a:t>11/9/2020</a:t>
             </a:fld>
             <a:endParaRPr lang="en-MY"/>
           </a:p>
@@ -2687,7 +2687,7 @@
           <a:p>
             <a:fld id="{47616425-BEE7-450B-80FF-511C9063157C}" type="datetimeFigureOut">
               <a:rPr lang="en-MY" smtClean="0"/>
-              <a:t>21/3/2020</a:t>
+              <a:t>11/9/2020</a:t>
             </a:fld>
             <a:endParaRPr lang="en-MY"/>
           </a:p>
@@ -2935,7 +2935,7 @@
           <a:p>
             <a:fld id="{47616425-BEE7-450B-80FF-511C9063157C}" type="datetimeFigureOut">
               <a:rPr lang="en-MY" smtClean="0"/>
-              <a:t>21/3/2020</a:t>
+              <a:t>11/9/2020</a:t>
             </a:fld>
             <a:endParaRPr lang="en-MY"/>
           </a:p>
@@ -8529,6 +8529,618 @@
           </p:grpSp>
         </p:grpSp>
       </p:grpSp>
+      <p:grpSp>
+        <p:nvGrpSpPr>
+          <p:cNvPr id="129" name="Group 128">
+            <a:extLst>
+              <a:ext uri="{FF2B5EF4-FFF2-40B4-BE49-F238E27FC236}">
+                <a16:creationId xmlns:a16="http://schemas.microsoft.com/office/drawing/2014/main" id="{2046E228-12A2-4E0E-B0F3-725D97D0CB48}"/>
+              </a:ext>
+            </a:extLst>
+          </p:cNvPr>
+          <p:cNvGrpSpPr/>
+          <p:nvPr/>
+        </p:nvGrpSpPr>
+        <p:grpSpPr>
+          <a:xfrm>
+            <a:off x="11688292" y="4560437"/>
+            <a:ext cx="1828800" cy="1828800"/>
+            <a:chOff x="9144000" y="3138976"/>
+            <a:chExt cx="2286000" cy="2286000"/>
+          </a:xfrm>
+        </p:grpSpPr>
+        <p:sp>
+          <p:nvSpPr>
+            <p:cNvPr id="130" name="Rectangle: Rounded Corners 129">
+              <a:extLst>
+                <a:ext uri="{FF2B5EF4-FFF2-40B4-BE49-F238E27FC236}">
+                  <a16:creationId xmlns:a16="http://schemas.microsoft.com/office/drawing/2014/main" id="{3AB0E241-22DC-470C-A668-C4F6DC302633}"/>
+                </a:ext>
+              </a:extLst>
+            </p:cNvPr>
+            <p:cNvSpPr/>
+            <p:nvPr/>
+          </p:nvSpPr>
+          <p:spPr>
+            <a:xfrm>
+              <a:off x="9144000" y="3138976"/>
+              <a:ext cx="2286000" cy="2286000"/>
+            </a:xfrm>
+            <a:prstGeom prst="roundRect">
+              <a:avLst>
+                <a:gd name="adj" fmla="val 19027"/>
+              </a:avLst>
+            </a:prstGeom>
+            <a:solidFill>
+              <a:schemeClr val="tx1">
+                <a:lumMod val="85000"/>
+                <a:lumOff val="15000"/>
+              </a:schemeClr>
+            </a:solidFill>
+            <a:ln>
+              <a:noFill/>
+            </a:ln>
+          </p:spPr>
+          <p:style>
+            <a:lnRef idx="2">
+              <a:schemeClr val="accent1">
+                <a:shade val="50000"/>
+              </a:schemeClr>
+            </a:lnRef>
+            <a:fillRef idx="1">
+              <a:schemeClr val="accent1"/>
+            </a:fillRef>
+            <a:effectRef idx="0">
+              <a:schemeClr val="accent1"/>
+            </a:effectRef>
+            <a:fontRef idx="minor">
+              <a:schemeClr val="lt1"/>
+            </a:fontRef>
+          </p:style>
+          <p:txBody>
+            <a:bodyPr rtlCol="0" anchor="ctr"/>
+            <a:lstStyle/>
+            <a:p>
+              <a:pPr algn="ctr"/>
+              <a:endParaRPr lang="en-MY"/>
+            </a:p>
+          </p:txBody>
+        </p:sp>
+        <p:grpSp>
+          <p:nvGrpSpPr>
+            <p:cNvPr id="131" name="Group 130">
+              <a:extLst>
+                <a:ext uri="{FF2B5EF4-FFF2-40B4-BE49-F238E27FC236}">
+                  <a16:creationId xmlns:a16="http://schemas.microsoft.com/office/drawing/2014/main" id="{99C9AB24-5F36-497D-9607-CAAE6E45B84B}"/>
+                </a:ext>
+              </a:extLst>
+            </p:cNvPr>
+            <p:cNvGrpSpPr/>
+            <p:nvPr/>
+          </p:nvGrpSpPr>
+          <p:grpSpPr>
+            <a:xfrm>
+              <a:off x="9509760" y="3504736"/>
+              <a:ext cx="1554480" cy="1554480"/>
+              <a:chOff x="9787508" y="502158"/>
+              <a:chExt cx="1836421" cy="1676396"/>
+            </a:xfrm>
+            <a:effectLst>
+              <a:outerShdw blurRad="63500" dist="38100" dir="3600000" sx="101000" sy="101000" algn="tl" rotWithShape="0">
+                <a:prstClr val="black">
+                  <a:alpha val="50000"/>
+                </a:prstClr>
+              </a:outerShdw>
+            </a:effectLst>
+          </p:grpSpPr>
+          <p:grpSp>
+            <p:nvGrpSpPr>
+              <p:cNvPr id="132" name="Group 131">
+                <a:extLst>
+                  <a:ext uri="{FF2B5EF4-FFF2-40B4-BE49-F238E27FC236}">
+                    <a16:creationId xmlns:a16="http://schemas.microsoft.com/office/drawing/2014/main" id="{57617754-712A-48F8-8F5F-9171EACEDBAB}"/>
+                  </a:ext>
+                </a:extLst>
+              </p:cNvPr>
+              <p:cNvGrpSpPr/>
+              <p:nvPr/>
+            </p:nvGrpSpPr>
+            <p:grpSpPr>
+              <a:xfrm>
+                <a:off x="9787509" y="502158"/>
+                <a:ext cx="1836419" cy="365760"/>
+                <a:chOff x="9787509" y="502158"/>
+                <a:chExt cx="1836419" cy="365760"/>
+              </a:xfrm>
+              <a:solidFill>
+                <a:srgbClr val="FF5050"/>
+              </a:solidFill>
+            </p:grpSpPr>
+            <p:sp>
+              <p:nvSpPr>
+                <p:cNvPr id="142" name="Rectangle 141">
+                  <a:extLst>
+                    <a:ext uri="{FF2B5EF4-FFF2-40B4-BE49-F238E27FC236}">
+                      <a16:creationId xmlns:a16="http://schemas.microsoft.com/office/drawing/2014/main" id="{D590142E-B232-4645-B617-82F577A1CF02}"/>
+                    </a:ext>
+                  </a:extLst>
+                </p:cNvPr>
+                <p:cNvSpPr/>
+                <p:nvPr/>
+              </p:nvSpPr>
+              <p:spPr>
+                <a:xfrm>
+                  <a:off x="10189845" y="502158"/>
+                  <a:ext cx="1434083" cy="365760"/>
+                </a:xfrm>
+                <a:prstGeom prst="rect">
+                  <a:avLst/>
+                </a:prstGeom>
+                <a:solidFill>
+                  <a:srgbClr val="FF5050"/>
+                </a:solidFill>
+                <a:ln>
+                  <a:noFill/>
+                </a:ln>
+              </p:spPr>
+              <p:style>
+                <a:lnRef idx="2">
+                  <a:schemeClr val="accent1">
+                    <a:shade val="50000"/>
+                  </a:schemeClr>
+                </a:lnRef>
+                <a:fillRef idx="1">
+                  <a:schemeClr val="accent1"/>
+                </a:fillRef>
+                <a:effectRef idx="0">
+                  <a:schemeClr val="accent1"/>
+                </a:effectRef>
+                <a:fontRef idx="minor">
+                  <a:schemeClr val="lt1"/>
+                </a:fontRef>
+              </p:style>
+              <p:txBody>
+                <a:bodyPr rtlCol="0" anchor="ctr"/>
+                <a:lstStyle/>
+                <a:p>
+                  <a:pPr algn="ctr"/>
+                  <a:endParaRPr lang="en-MY"/>
+                </a:p>
+              </p:txBody>
+            </p:sp>
+            <p:sp>
+              <p:nvSpPr>
+                <p:cNvPr id="143" name="Isosceles Triangle 142">
+                  <a:extLst>
+                    <a:ext uri="{FF2B5EF4-FFF2-40B4-BE49-F238E27FC236}">
+                      <a16:creationId xmlns:a16="http://schemas.microsoft.com/office/drawing/2014/main" id="{9117C99E-2125-4121-B64F-BB1F82A4F519}"/>
+                    </a:ext>
+                  </a:extLst>
+                </p:cNvPr>
+                <p:cNvSpPr/>
+                <p:nvPr/>
+              </p:nvSpPr>
+              <p:spPr>
+                <a:xfrm>
+                  <a:off x="9787509" y="502158"/>
+                  <a:ext cx="402336" cy="365760"/>
+                </a:xfrm>
+                <a:prstGeom prst="triangle">
+                  <a:avLst>
+                    <a:gd name="adj" fmla="val 100000"/>
+                  </a:avLst>
+                </a:prstGeom>
+                <a:grpFill/>
+                <a:ln>
+                  <a:noFill/>
+                </a:ln>
+              </p:spPr>
+              <p:style>
+                <a:lnRef idx="2">
+                  <a:schemeClr val="accent1">
+                    <a:shade val="50000"/>
+                  </a:schemeClr>
+                </a:lnRef>
+                <a:fillRef idx="1">
+                  <a:schemeClr val="accent1"/>
+                </a:fillRef>
+                <a:effectRef idx="0">
+                  <a:schemeClr val="accent1"/>
+                </a:effectRef>
+                <a:fontRef idx="minor">
+                  <a:schemeClr val="lt1"/>
+                </a:fontRef>
+              </p:style>
+              <p:txBody>
+                <a:bodyPr rtlCol="0" anchor="ctr"/>
+                <a:lstStyle/>
+                <a:p>
+                  <a:pPr algn="ctr"/>
+                  <a:endParaRPr lang="en-MY"/>
+                </a:p>
+              </p:txBody>
+            </p:sp>
+          </p:grpSp>
+          <p:grpSp>
+            <p:nvGrpSpPr>
+              <p:cNvPr id="133" name="Group 132">
+                <a:extLst>
+                  <a:ext uri="{FF2B5EF4-FFF2-40B4-BE49-F238E27FC236}">
+                    <a16:creationId xmlns:a16="http://schemas.microsoft.com/office/drawing/2014/main" id="{3EE4F1EA-DEF7-40C1-ACC5-5F7240E50307}"/>
+                  </a:ext>
+                </a:extLst>
+              </p:cNvPr>
+              <p:cNvGrpSpPr/>
+              <p:nvPr/>
+            </p:nvGrpSpPr>
+            <p:grpSpPr>
+              <a:xfrm>
+                <a:off x="9787508" y="939037"/>
+                <a:ext cx="1280161" cy="365760"/>
+                <a:chOff x="9787508" y="939037"/>
+                <a:chExt cx="1280161" cy="365760"/>
+              </a:xfrm>
+              <a:solidFill>
+                <a:srgbClr val="FFFF66"/>
+              </a:solidFill>
+            </p:grpSpPr>
+            <p:sp>
+              <p:nvSpPr>
+                <p:cNvPr id="140" name="Rectangle 139">
+                  <a:extLst>
+                    <a:ext uri="{FF2B5EF4-FFF2-40B4-BE49-F238E27FC236}">
+                      <a16:creationId xmlns:a16="http://schemas.microsoft.com/office/drawing/2014/main" id="{B066A083-CEFC-4C4E-966F-82EAC9341641}"/>
+                    </a:ext>
+                  </a:extLst>
+                </p:cNvPr>
+                <p:cNvSpPr/>
+                <p:nvPr/>
+              </p:nvSpPr>
+              <p:spPr>
+                <a:xfrm rot="10800000">
+                  <a:off x="9787508" y="939037"/>
+                  <a:ext cx="877824" cy="365760"/>
+                </a:xfrm>
+                <a:prstGeom prst="rect">
+                  <a:avLst/>
+                </a:prstGeom>
+                <a:grpFill/>
+                <a:ln>
+                  <a:noFill/>
+                </a:ln>
+              </p:spPr>
+              <p:style>
+                <a:lnRef idx="2">
+                  <a:schemeClr val="accent1">
+                    <a:shade val="50000"/>
+                  </a:schemeClr>
+                </a:lnRef>
+                <a:fillRef idx="1">
+                  <a:schemeClr val="accent1"/>
+                </a:fillRef>
+                <a:effectRef idx="0">
+                  <a:schemeClr val="accent1"/>
+                </a:effectRef>
+                <a:fontRef idx="minor">
+                  <a:schemeClr val="lt1"/>
+                </a:fontRef>
+              </p:style>
+              <p:txBody>
+                <a:bodyPr rtlCol="0" anchor="ctr"/>
+                <a:lstStyle/>
+                <a:p>
+                  <a:pPr algn="ctr"/>
+                  <a:endParaRPr lang="en-MY"/>
+                </a:p>
+              </p:txBody>
+            </p:sp>
+            <p:sp>
+              <p:nvSpPr>
+                <p:cNvPr id="141" name="Isosceles Triangle 140">
+                  <a:extLst>
+                    <a:ext uri="{FF2B5EF4-FFF2-40B4-BE49-F238E27FC236}">
+                      <a16:creationId xmlns:a16="http://schemas.microsoft.com/office/drawing/2014/main" id="{99B5E6C8-04E2-49FB-849A-DD16921150E4}"/>
+                    </a:ext>
+                  </a:extLst>
+                </p:cNvPr>
+                <p:cNvSpPr/>
+                <p:nvPr/>
+              </p:nvSpPr>
+              <p:spPr>
+                <a:xfrm rot="10800000">
+                  <a:off x="10665333" y="939037"/>
+                  <a:ext cx="402336" cy="365760"/>
+                </a:xfrm>
+                <a:prstGeom prst="triangle">
+                  <a:avLst>
+                    <a:gd name="adj" fmla="val 100000"/>
+                  </a:avLst>
+                </a:prstGeom>
+                <a:grpFill/>
+                <a:ln>
+                  <a:noFill/>
+                </a:ln>
+              </p:spPr>
+              <p:style>
+                <a:lnRef idx="2">
+                  <a:schemeClr val="accent1">
+                    <a:shade val="50000"/>
+                  </a:schemeClr>
+                </a:lnRef>
+                <a:fillRef idx="1">
+                  <a:schemeClr val="accent1"/>
+                </a:fillRef>
+                <a:effectRef idx="0">
+                  <a:schemeClr val="accent1"/>
+                </a:effectRef>
+                <a:fontRef idx="minor">
+                  <a:schemeClr val="lt1"/>
+                </a:fontRef>
+              </p:style>
+              <p:txBody>
+                <a:bodyPr rtlCol="0" anchor="ctr"/>
+                <a:lstStyle/>
+                <a:p>
+                  <a:pPr algn="ctr"/>
+                  <a:endParaRPr lang="en-MY"/>
+                </a:p>
+              </p:txBody>
+            </p:sp>
+          </p:grpSp>
+          <p:grpSp>
+            <p:nvGrpSpPr>
+              <p:cNvPr id="134" name="Group 133">
+                <a:extLst>
+                  <a:ext uri="{FF2B5EF4-FFF2-40B4-BE49-F238E27FC236}">
+                    <a16:creationId xmlns:a16="http://schemas.microsoft.com/office/drawing/2014/main" id="{62838500-D839-4C65-9D4B-7A58FAC4BB62}"/>
+                  </a:ext>
+                </a:extLst>
+              </p:cNvPr>
+              <p:cNvGrpSpPr/>
+              <p:nvPr/>
+            </p:nvGrpSpPr>
+            <p:grpSpPr>
+              <a:xfrm>
+                <a:off x="9787508" y="1812794"/>
+                <a:ext cx="1836421" cy="365760"/>
+                <a:chOff x="9787508" y="1812794"/>
+                <a:chExt cx="1836421" cy="365760"/>
+              </a:xfrm>
+              <a:solidFill>
+                <a:srgbClr val="66CCFF"/>
+              </a:solidFill>
+            </p:grpSpPr>
+            <p:sp>
+              <p:nvSpPr>
+                <p:cNvPr id="138" name="Rectangle 137">
+                  <a:extLst>
+                    <a:ext uri="{FF2B5EF4-FFF2-40B4-BE49-F238E27FC236}">
+                      <a16:creationId xmlns:a16="http://schemas.microsoft.com/office/drawing/2014/main" id="{9B7533D1-3499-47B6-AECA-992C7D01564B}"/>
+                    </a:ext>
+                  </a:extLst>
+                </p:cNvPr>
+                <p:cNvSpPr/>
+                <p:nvPr/>
+              </p:nvSpPr>
+              <p:spPr>
+                <a:xfrm rot="10800000">
+                  <a:off x="9787508" y="1812794"/>
+                  <a:ext cx="1434084" cy="365760"/>
+                </a:xfrm>
+                <a:prstGeom prst="rect">
+                  <a:avLst/>
+                </a:prstGeom>
+                <a:grpFill/>
+                <a:ln>
+                  <a:noFill/>
+                </a:ln>
+              </p:spPr>
+              <p:style>
+                <a:lnRef idx="2">
+                  <a:schemeClr val="accent1">
+                    <a:shade val="50000"/>
+                  </a:schemeClr>
+                </a:lnRef>
+                <a:fillRef idx="1">
+                  <a:schemeClr val="accent1"/>
+                </a:fillRef>
+                <a:effectRef idx="0">
+                  <a:schemeClr val="accent1"/>
+                </a:effectRef>
+                <a:fontRef idx="minor">
+                  <a:schemeClr val="lt1"/>
+                </a:fontRef>
+              </p:style>
+              <p:txBody>
+                <a:bodyPr rtlCol="0" anchor="ctr"/>
+                <a:lstStyle/>
+                <a:p>
+                  <a:pPr algn="ctr"/>
+                  <a:endParaRPr lang="en-MY"/>
+                </a:p>
+              </p:txBody>
+            </p:sp>
+            <p:sp>
+              <p:nvSpPr>
+                <p:cNvPr id="139" name="Isosceles Triangle 138">
+                  <a:extLst>
+                    <a:ext uri="{FF2B5EF4-FFF2-40B4-BE49-F238E27FC236}">
+                      <a16:creationId xmlns:a16="http://schemas.microsoft.com/office/drawing/2014/main" id="{A85B753A-0161-47A9-8A73-D3BC550AB34B}"/>
+                    </a:ext>
+                  </a:extLst>
+                </p:cNvPr>
+                <p:cNvSpPr/>
+                <p:nvPr/>
+              </p:nvSpPr>
+              <p:spPr>
+                <a:xfrm rot="10800000">
+                  <a:off x="11221593" y="1812794"/>
+                  <a:ext cx="402336" cy="365760"/>
+                </a:xfrm>
+                <a:prstGeom prst="triangle">
+                  <a:avLst>
+                    <a:gd name="adj" fmla="val 100000"/>
+                  </a:avLst>
+                </a:prstGeom>
+                <a:grpFill/>
+                <a:ln>
+                  <a:noFill/>
+                </a:ln>
+              </p:spPr>
+              <p:style>
+                <a:lnRef idx="2">
+                  <a:schemeClr val="accent1">
+                    <a:shade val="50000"/>
+                  </a:schemeClr>
+                </a:lnRef>
+                <a:fillRef idx="1">
+                  <a:schemeClr val="accent1"/>
+                </a:fillRef>
+                <a:effectRef idx="0">
+                  <a:schemeClr val="accent1"/>
+                </a:effectRef>
+                <a:fontRef idx="minor">
+                  <a:schemeClr val="lt1"/>
+                </a:fontRef>
+              </p:style>
+              <p:txBody>
+                <a:bodyPr rtlCol="0" anchor="ctr"/>
+                <a:lstStyle/>
+                <a:p>
+                  <a:pPr algn="ctr"/>
+                  <a:endParaRPr lang="en-MY"/>
+                </a:p>
+              </p:txBody>
+            </p:sp>
+          </p:grpSp>
+          <p:grpSp>
+            <p:nvGrpSpPr>
+              <p:cNvPr id="135" name="Group 134">
+                <a:extLst>
+                  <a:ext uri="{FF2B5EF4-FFF2-40B4-BE49-F238E27FC236}">
+                    <a16:creationId xmlns:a16="http://schemas.microsoft.com/office/drawing/2014/main" id="{D007958F-6B18-434A-A11E-E168D3DDADF0}"/>
+                  </a:ext>
+                </a:extLst>
+              </p:cNvPr>
+              <p:cNvGrpSpPr/>
+              <p:nvPr/>
+            </p:nvGrpSpPr>
+            <p:grpSpPr>
+              <a:xfrm>
+                <a:off x="10343007" y="1375915"/>
+                <a:ext cx="1280921" cy="365760"/>
+                <a:chOff x="10343007" y="1375915"/>
+                <a:chExt cx="1280921" cy="365760"/>
+              </a:xfrm>
+              <a:solidFill>
+                <a:srgbClr val="00FFCC"/>
+              </a:solidFill>
+            </p:grpSpPr>
+            <p:sp>
+              <p:nvSpPr>
+                <p:cNvPr id="136" name="Rectangle 135">
+                  <a:extLst>
+                    <a:ext uri="{FF2B5EF4-FFF2-40B4-BE49-F238E27FC236}">
+                      <a16:creationId xmlns:a16="http://schemas.microsoft.com/office/drawing/2014/main" id="{A4D8E849-87F2-4650-B21E-BEBA9E2D946C}"/>
+                    </a:ext>
+                  </a:extLst>
+                </p:cNvPr>
+                <p:cNvSpPr/>
+                <p:nvPr/>
+              </p:nvSpPr>
+              <p:spPr>
+                <a:xfrm>
+                  <a:off x="10745343" y="1375915"/>
+                  <a:ext cx="878585" cy="365760"/>
+                </a:xfrm>
+                <a:prstGeom prst="rect">
+                  <a:avLst/>
+                </a:prstGeom>
+                <a:grpFill/>
+                <a:ln>
+                  <a:noFill/>
+                </a:ln>
+              </p:spPr>
+              <p:style>
+                <a:lnRef idx="2">
+                  <a:schemeClr val="accent1">
+                    <a:shade val="50000"/>
+                  </a:schemeClr>
+                </a:lnRef>
+                <a:fillRef idx="1">
+                  <a:schemeClr val="accent1"/>
+                </a:fillRef>
+                <a:effectRef idx="0">
+                  <a:schemeClr val="accent1"/>
+                </a:effectRef>
+                <a:fontRef idx="minor">
+                  <a:schemeClr val="lt1"/>
+                </a:fontRef>
+              </p:style>
+              <p:txBody>
+                <a:bodyPr rtlCol="0" anchor="ctr"/>
+                <a:lstStyle/>
+                <a:p>
+                  <a:pPr algn="ctr"/>
+                  <a:endParaRPr lang="en-MY"/>
+                </a:p>
+              </p:txBody>
+            </p:sp>
+            <p:sp>
+              <p:nvSpPr>
+                <p:cNvPr id="137" name="Isosceles Triangle 136">
+                  <a:extLst>
+                    <a:ext uri="{FF2B5EF4-FFF2-40B4-BE49-F238E27FC236}">
+                      <a16:creationId xmlns:a16="http://schemas.microsoft.com/office/drawing/2014/main" id="{872396FA-72A5-470E-8136-94BF84B7887A}"/>
+                    </a:ext>
+                  </a:extLst>
+                </p:cNvPr>
+                <p:cNvSpPr/>
+                <p:nvPr/>
+              </p:nvSpPr>
+              <p:spPr>
+                <a:xfrm>
+                  <a:off x="10343007" y="1375915"/>
+                  <a:ext cx="402336" cy="365760"/>
+                </a:xfrm>
+                <a:prstGeom prst="triangle">
+                  <a:avLst>
+                    <a:gd name="adj" fmla="val 100000"/>
+                  </a:avLst>
+                </a:prstGeom>
+                <a:grpFill/>
+                <a:ln>
+                  <a:noFill/>
+                </a:ln>
+              </p:spPr>
+              <p:style>
+                <a:lnRef idx="2">
+                  <a:schemeClr val="accent1">
+                    <a:shade val="50000"/>
+                  </a:schemeClr>
+                </a:lnRef>
+                <a:fillRef idx="1">
+                  <a:schemeClr val="accent1"/>
+                </a:fillRef>
+                <a:effectRef idx="0">
+                  <a:schemeClr val="accent1"/>
+                </a:effectRef>
+                <a:fontRef idx="minor">
+                  <a:schemeClr val="lt1"/>
+                </a:fontRef>
+              </p:style>
+              <p:txBody>
+                <a:bodyPr rtlCol="0" anchor="ctr"/>
+                <a:lstStyle/>
+                <a:p>
+                  <a:pPr algn="ctr"/>
+                  <a:endParaRPr lang="en-MY"/>
+                </a:p>
+              </p:txBody>
+            </p:sp>
+          </p:grpSp>
+        </p:grpSp>
+      </p:grpSp>
     </p:spTree>
     <p:extLst>
       <p:ext uri="{BB962C8B-B14F-4D97-AF65-F5344CB8AC3E}">

</xml_diff>